<commit_message>
Final projekt  vorstellung presentation
</commit_message>
<xml_diff>
--- a/presentations/projekt-vorstellung.pptx
+++ b/presentations/projekt-vorstellung.pptx
@@ -5,22 +5,22 @@
     <p:sldMasterId id="2147483676" r:id="rId1"/>
   </p:sldMasterIdLst>
   <p:notesMasterIdLst>
-    <p:notesMasterId r:id="rId20"/>
+    <p:notesMasterId r:id="rId22"/>
   </p:notesMasterIdLst>
   <p:handoutMasterIdLst>
-    <p:handoutMasterId r:id="rId21"/>
+    <p:handoutMasterId r:id="rId23"/>
   </p:handoutMasterIdLst>
   <p:sldIdLst>
     <p:sldId id="256" r:id="rId2"/>
     <p:sldId id="293" r:id="rId3"/>
-    <p:sldId id="296" r:id="rId4"/>
-    <p:sldId id="305" r:id="rId5"/>
-    <p:sldId id="306" r:id="rId6"/>
-    <p:sldId id="307" r:id="rId7"/>
-    <p:sldId id="308" r:id="rId8"/>
-    <p:sldId id="309" r:id="rId9"/>
-    <p:sldId id="310" r:id="rId10"/>
-    <p:sldId id="312" r:id="rId11"/>
+    <p:sldId id="305" r:id="rId4"/>
+    <p:sldId id="306" r:id="rId5"/>
+    <p:sldId id="307" r:id="rId6"/>
+    <p:sldId id="308" r:id="rId7"/>
+    <p:sldId id="309" r:id="rId8"/>
+    <p:sldId id="310" r:id="rId9"/>
+    <p:sldId id="317" r:id="rId10"/>
+    <p:sldId id="316" r:id="rId11"/>
     <p:sldId id="313" r:id="rId12"/>
     <p:sldId id="314" r:id="rId13"/>
     <p:sldId id="315" r:id="rId14"/>
@@ -29,6 +29,8 @@
     <p:sldId id="298" r:id="rId17"/>
     <p:sldId id="300" r:id="rId18"/>
     <p:sldId id="294" r:id="rId19"/>
+    <p:sldId id="296" r:id="rId20"/>
+    <p:sldId id="318" r:id="rId21"/>
   </p:sldIdLst>
   <p:sldSz cx="9144000" cy="6858000" type="screen4x3"/>
   <p:notesSz cx="6858000" cy="9144000"/>
@@ -164,14 +166,14 @@
           <p14:sldIdLst>
             <p14:sldId id="256"/>
             <p14:sldId id="293"/>
-            <p14:sldId id="296"/>
             <p14:sldId id="305"/>
             <p14:sldId id="306"/>
             <p14:sldId id="307"/>
             <p14:sldId id="308"/>
             <p14:sldId id="309"/>
             <p14:sldId id="310"/>
-            <p14:sldId id="312"/>
+            <p14:sldId id="317"/>
+            <p14:sldId id="316"/>
             <p14:sldId id="313"/>
             <p14:sldId id="314"/>
             <p14:sldId id="315"/>
@@ -180,6 +182,8 @@
             <p14:sldId id="298"/>
             <p14:sldId id="300"/>
             <p14:sldId id="294"/>
+            <p14:sldId id="296"/>
+            <p14:sldId id="318"/>
           </p14:sldIdLst>
         </p14:section>
       </p14:sectionLst>
@@ -2120,6 +2124,327 @@
 </p:notes>
 </file>
 
+<file path=ppt/notesSlides/notesSlide18.xml><?xml version="1.0" encoding="utf-8"?>
+<p:notes xmlns:a="http://schemas.openxmlformats.org/drawingml/2006/main" xmlns:r="http://schemas.openxmlformats.org/officeDocument/2006/relationships" xmlns:p="http://schemas.openxmlformats.org/presentationml/2006/main">
+  <p:cSld>
+    <p:spTree>
+      <p:nvGrpSpPr>
+        <p:cNvPr id="1" name=""/>
+        <p:cNvGrpSpPr/>
+        <p:nvPr/>
+      </p:nvGrpSpPr>
+      <p:grpSpPr>
+        <a:xfrm>
+          <a:off x="0" y="0"/>
+          <a:ext cx="0" cy="0"/>
+          <a:chOff x="0" y="0"/>
+          <a:chExt cx="0" cy="0"/>
+        </a:xfrm>
+      </p:grpSpPr>
+      <p:sp>
+        <p:nvSpPr>
+          <p:cNvPr id="18433" name="Folienbildplatzhalter 1"/>
+          <p:cNvSpPr>
+            <a:spLocks noGrp="1" noRot="1" noChangeAspect="1"/>
+          </p:cNvSpPr>
+          <p:nvPr>
+            <p:ph type="sldImg"/>
+          </p:nvPr>
+        </p:nvSpPr>
+        <p:spPr>
+          <a:ln/>
+        </p:spPr>
+      </p:sp>
+      <p:sp>
+        <p:nvSpPr>
+          <p:cNvPr id="18434" name="Notizenplatzhalter 2"/>
+          <p:cNvSpPr>
+            <a:spLocks noGrp="1"/>
+          </p:cNvSpPr>
+          <p:nvPr>
+            <p:ph type="body" idx="1"/>
+          </p:nvPr>
+        </p:nvSpPr>
+        <p:spPr>
+          <a:noFill/>
+        </p:spPr>
+        <p:txBody>
+          <a:bodyPr/>
+          <a:lstStyle/>
+          <a:p>
+            <a:pPr lvl="1"/>
+            <a:r>
+              <a:rPr lang="de-DE" noProof="0" dirty="0"/>
+              <a:t>Kann verschiedene Strategien auch schlecht vergleichen</a:t>
+            </a:r>
+            <a:r>
+              <a:rPr lang="de-DE" baseline="0" noProof="0" dirty="0"/>
+              <a:t> ohne Simulation, da Last sich ändert</a:t>
+            </a:r>
+            <a:endParaRPr lang="de-DE" noProof="0" dirty="0"/>
+          </a:p>
+          <a:p>
+            <a:pPr lvl="1"/>
+            <a:endParaRPr lang="de-DE" noProof="0" dirty="0"/>
+          </a:p>
+          <a:p>
+            <a:pPr lvl="1"/>
+            <a:r>
+              <a:rPr lang="de-DE" noProof="0" dirty="0"/>
+              <a:t>Eher neue Leitung, oder Cache</a:t>
+            </a:r>
+            <a:r>
+              <a:rPr lang="de-DE" baseline="0" noProof="0" dirty="0"/>
+              <a:t> oder mehr CPU, was bringt die beste Leistung fürs wenigste Geld</a:t>
+            </a:r>
+          </a:p>
+          <a:p>
+            <a:pPr lvl="1"/>
+            <a:r>
+              <a:rPr lang="de-DE" baseline="0" noProof="0" dirty="0"/>
+              <a:t>Alle </a:t>
+            </a:r>
+            <a:r>
+              <a:rPr lang="de-DE" baseline="0" noProof="0" dirty="0" err="1"/>
+              <a:t>side</a:t>
+            </a:r>
+            <a:r>
+              <a:rPr lang="de-DE" baseline="0" noProof="0" dirty="0"/>
+              <a:t> </a:t>
+            </a:r>
+            <a:r>
+              <a:rPr lang="de-DE" baseline="0" noProof="0" dirty="0" err="1"/>
+              <a:t>effects</a:t>
+            </a:r>
+            <a:r>
+              <a:rPr lang="de-DE" baseline="0" noProof="0" dirty="0"/>
+              <a:t> kann man nicht berücksichtigen</a:t>
+            </a:r>
+          </a:p>
+          <a:p>
+            <a:pPr lvl="1"/>
+            <a:endParaRPr lang="de-DE" baseline="0" noProof="0" dirty="0"/>
+          </a:p>
+          <a:p>
+            <a:pPr lvl="1"/>
+            <a:r>
+              <a:rPr lang="de-DE" baseline="0" noProof="0" dirty="0"/>
+              <a:t>10fache</a:t>
+            </a:r>
+            <a:endParaRPr lang="de-DE" noProof="0" dirty="0"/>
+          </a:p>
+        </p:txBody>
+      </p:sp>
+      <p:sp>
+        <p:nvSpPr>
+          <p:cNvPr id="18435" name="Foliennummernplatzhalter 3"/>
+          <p:cNvSpPr>
+            <a:spLocks noGrp="1"/>
+          </p:cNvSpPr>
+          <p:nvPr>
+            <p:ph type="sldNum" sz="quarter" idx="5"/>
+          </p:nvPr>
+        </p:nvSpPr>
+        <p:spPr>
+          <a:noFill/>
+          <a:ln>
+            <a:miter lim="800000"/>
+            <a:headEnd/>
+            <a:tailEnd/>
+          </a:ln>
+        </p:spPr>
+        <p:txBody>
+          <a:bodyPr/>
+          <a:lstStyle/>
+          <a:p>
+            <a:fld id="{D068F00D-1DBB-4EA3-9C27-90DB30B34AF1}" type="slidenum">
+              <a:rPr lang="en-GB" smtClean="0">
+                <a:cs typeface="Arial" charset="0"/>
+              </a:rPr>
+              <a:pPr/>
+              <a:t>19</a:t>
+            </a:fld>
+            <a:endParaRPr lang="en-GB">
+              <a:cs typeface="Arial" charset="0"/>
+            </a:endParaRPr>
+          </a:p>
+        </p:txBody>
+      </p:sp>
+    </p:spTree>
+    <p:extLst>
+      <p:ext uri="{BB962C8B-B14F-4D97-AF65-F5344CB8AC3E}">
+        <p14:creationId xmlns:p14="http://schemas.microsoft.com/office/powerpoint/2010/main" val="3797985148"/>
+      </p:ext>
+    </p:extLst>
+  </p:cSld>
+  <p:clrMapOvr>
+    <a:masterClrMapping/>
+  </p:clrMapOvr>
+</p:notes>
+</file>
+
+<file path=ppt/notesSlides/notesSlide19.xml><?xml version="1.0" encoding="utf-8"?>
+<p:notes xmlns:a="http://schemas.openxmlformats.org/drawingml/2006/main" xmlns:r="http://schemas.openxmlformats.org/officeDocument/2006/relationships" xmlns:p="http://schemas.openxmlformats.org/presentationml/2006/main">
+  <p:cSld>
+    <p:spTree>
+      <p:nvGrpSpPr>
+        <p:cNvPr id="1" name=""/>
+        <p:cNvGrpSpPr/>
+        <p:nvPr/>
+      </p:nvGrpSpPr>
+      <p:grpSpPr>
+        <a:xfrm>
+          <a:off x="0" y="0"/>
+          <a:ext cx="0" cy="0"/>
+          <a:chOff x="0" y="0"/>
+          <a:chExt cx="0" cy="0"/>
+        </a:xfrm>
+      </p:grpSpPr>
+      <p:sp>
+        <p:nvSpPr>
+          <p:cNvPr id="18433" name="Folienbildplatzhalter 1"/>
+          <p:cNvSpPr>
+            <a:spLocks noGrp="1" noRot="1" noChangeAspect="1"/>
+          </p:cNvSpPr>
+          <p:nvPr>
+            <p:ph type="sldImg"/>
+          </p:nvPr>
+        </p:nvSpPr>
+        <p:spPr>
+          <a:ln/>
+        </p:spPr>
+      </p:sp>
+      <p:sp>
+        <p:nvSpPr>
+          <p:cNvPr id="18434" name="Notizenplatzhalter 2"/>
+          <p:cNvSpPr>
+            <a:spLocks noGrp="1"/>
+          </p:cNvSpPr>
+          <p:nvPr>
+            <p:ph type="body" idx="1"/>
+          </p:nvPr>
+        </p:nvSpPr>
+        <p:spPr>
+          <a:noFill/>
+        </p:spPr>
+        <p:txBody>
+          <a:bodyPr/>
+          <a:lstStyle/>
+          <a:p>
+            <a:pPr lvl="1"/>
+            <a:r>
+              <a:rPr lang="de-DE" noProof="0" dirty="0"/>
+              <a:t>Abgegrenzt von </a:t>
+            </a:r>
+            <a:r>
+              <a:rPr lang="de-DE" noProof="0" dirty="0" err="1"/>
+              <a:t>rationalismus</a:t>
+            </a:r>
+            <a:r>
+              <a:rPr lang="de-DE" noProof="0" dirty="0"/>
+              <a:t> und </a:t>
+            </a:r>
+            <a:r>
+              <a:rPr lang="de-DE" noProof="0" dirty="0" err="1"/>
+              <a:t>empirie</a:t>
+            </a:r>
+            <a:endParaRPr lang="de-DE" noProof="0" dirty="0"/>
+          </a:p>
+          <a:p>
+            <a:pPr lvl="1"/>
+            <a:r>
+              <a:rPr lang="de-DE" noProof="0" dirty="0"/>
+              <a:t>Rationalismus: nutze Deduktion um Theorien/Wissen zu bilden (Mathe)</a:t>
+            </a:r>
+          </a:p>
+          <a:p>
+            <a:pPr lvl="1"/>
+            <a:r>
+              <a:rPr lang="de-DE" noProof="0" dirty="0"/>
+              <a:t>Empirie: Nur durch beobachten</a:t>
+            </a:r>
+          </a:p>
+          <a:p>
+            <a:pPr lvl="1"/>
+            <a:r>
+              <a:rPr lang="de-DE" noProof="0" dirty="0"/>
+              <a:t>Popper: was dazwischen gefunden, wissenschaftliche Theorien nie bewiesen, sondern nur </a:t>
+            </a:r>
+            <a:r>
+              <a:rPr lang="de-DE" noProof="0" dirty="0" err="1"/>
+              <a:t>falsiziert</a:t>
+            </a:r>
+            <a:endParaRPr lang="de-DE" noProof="0" dirty="0"/>
+          </a:p>
+          <a:p>
+            <a:pPr lvl="1"/>
+            <a:r>
+              <a:rPr lang="de-DE" noProof="0" dirty="0"/>
+              <a:t>(unterschied zu Rationalismus)</a:t>
+            </a:r>
+          </a:p>
+          <a:p>
+            <a:pPr lvl="1"/>
+            <a:r>
+              <a:rPr lang="de-DE" noProof="0" dirty="0"/>
+              <a:t>Unterschied zu Empirie: Erste entwickelt durch Denken und dann durch Empirie </a:t>
+            </a:r>
+            <a:r>
+              <a:rPr lang="de-DE" noProof="0"/>
+              <a:t>bestätitigenn</a:t>
+            </a:r>
+            <a:endParaRPr lang="de-DE" noProof="0" dirty="0"/>
+          </a:p>
+        </p:txBody>
+      </p:sp>
+      <p:sp>
+        <p:nvSpPr>
+          <p:cNvPr id="18435" name="Foliennummernplatzhalter 3"/>
+          <p:cNvSpPr>
+            <a:spLocks noGrp="1"/>
+          </p:cNvSpPr>
+          <p:nvPr>
+            <p:ph type="sldNum" sz="quarter" idx="5"/>
+          </p:nvPr>
+        </p:nvSpPr>
+        <p:spPr>
+          <a:noFill/>
+          <a:ln>
+            <a:miter lim="800000"/>
+            <a:headEnd/>
+            <a:tailEnd/>
+          </a:ln>
+        </p:spPr>
+        <p:txBody>
+          <a:bodyPr/>
+          <a:lstStyle/>
+          <a:p>
+            <a:fld id="{D068F00D-1DBB-4EA3-9C27-90DB30B34AF1}" type="slidenum">
+              <a:rPr lang="en-GB" smtClean="0">
+                <a:cs typeface="Arial" charset="0"/>
+              </a:rPr>
+              <a:pPr/>
+              <a:t>20</a:t>
+            </a:fld>
+            <a:endParaRPr lang="en-GB">
+              <a:cs typeface="Arial" charset="0"/>
+            </a:endParaRPr>
+          </a:p>
+        </p:txBody>
+      </p:sp>
+    </p:spTree>
+    <p:extLst>
+      <p:ext uri="{BB962C8B-B14F-4D97-AF65-F5344CB8AC3E}">
+        <p14:creationId xmlns:p14="http://schemas.microsoft.com/office/powerpoint/2010/main" val="2092161819"/>
+      </p:ext>
+    </p:extLst>
+  </p:cSld>
+  <p:clrMapOvr>
+    <a:masterClrMapping/>
+  </p:clrMapOvr>
+</p:notes>
+</file>
+
 <file path=ppt/notesSlides/notesSlide2.xml><?xml version="1.0" encoding="utf-8"?>
 <p:notes xmlns:a="http://schemas.openxmlformats.org/drawingml/2006/main" xmlns:r="http://schemas.openxmlformats.org/officeDocument/2006/relationships" xmlns:p="http://schemas.openxmlformats.org/presentationml/2006/main">
   <p:cSld>
@@ -2169,64 +2494,6 @@
           <a:lstStyle/>
           <a:p>
             <a:pPr lvl="1"/>
-            <a:r>
-              <a:rPr lang="de-DE" noProof="0" dirty="0"/>
-              <a:t>Kann verschiedene Strategien auch schlecht vergleichen</a:t>
-            </a:r>
-            <a:r>
-              <a:rPr lang="de-DE" baseline="0" noProof="0" dirty="0"/>
-              <a:t> ohne Simulation, da Last sich ändert</a:t>
-            </a:r>
-            <a:endParaRPr lang="de-DE" noProof="0" dirty="0"/>
-          </a:p>
-          <a:p>
-            <a:pPr lvl="1"/>
-            <a:endParaRPr lang="de-DE" noProof="0" dirty="0"/>
-          </a:p>
-          <a:p>
-            <a:pPr lvl="1"/>
-            <a:r>
-              <a:rPr lang="de-DE" noProof="0" dirty="0"/>
-              <a:t>Eher neue Leitung, oder Cache</a:t>
-            </a:r>
-            <a:r>
-              <a:rPr lang="de-DE" baseline="0" noProof="0" dirty="0"/>
-              <a:t> oder mehr CPU, was bringt die beste Leistung fürs wenigste Geld</a:t>
-            </a:r>
-          </a:p>
-          <a:p>
-            <a:pPr lvl="1"/>
-            <a:r>
-              <a:rPr lang="de-DE" baseline="0" noProof="0" dirty="0"/>
-              <a:t>Alle </a:t>
-            </a:r>
-            <a:r>
-              <a:rPr lang="de-DE" baseline="0" noProof="0" dirty="0" err="1"/>
-              <a:t>side</a:t>
-            </a:r>
-            <a:r>
-              <a:rPr lang="de-DE" baseline="0" noProof="0" dirty="0"/>
-              <a:t> </a:t>
-            </a:r>
-            <a:r>
-              <a:rPr lang="de-DE" baseline="0" noProof="0" dirty="0" err="1"/>
-              <a:t>effects</a:t>
-            </a:r>
-            <a:r>
-              <a:rPr lang="de-DE" baseline="0" noProof="0" dirty="0"/>
-              <a:t> kann man nicht berücksichtigen</a:t>
-            </a:r>
-          </a:p>
-          <a:p>
-            <a:pPr lvl="1"/>
-            <a:endParaRPr lang="de-DE" baseline="0" noProof="0" dirty="0"/>
-          </a:p>
-          <a:p>
-            <a:pPr lvl="1"/>
-            <a:r>
-              <a:rPr lang="de-DE" baseline="0" noProof="0" dirty="0"/>
-              <a:t>10fache</a:t>
-            </a:r>
             <a:endParaRPr lang="de-DE" noProof="0" dirty="0"/>
           </a:p>
         </p:txBody>
@@ -2269,7 +2536,7 @@
     </p:spTree>
     <p:extLst>
       <p:ext uri="{BB962C8B-B14F-4D97-AF65-F5344CB8AC3E}">
-        <p14:creationId xmlns:p14="http://schemas.microsoft.com/office/powerpoint/2010/main" val="3797985148"/>
+        <p14:creationId xmlns:p14="http://schemas.microsoft.com/office/powerpoint/2010/main" val="3750095319"/>
       </p:ext>
     </p:extLst>
   </p:cSld>
@@ -2370,7 +2637,7 @@
     </p:spTree>
     <p:extLst>
       <p:ext uri="{BB962C8B-B14F-4D97-AF65-F5344CB8AC3E}">
-        <p14:creationId xmlns:p14="http://schemas.microsoft.com/office/powerpoint/2010/main" val="3750095319"/>
+        <p14:creationId xmlns:p14="http://schemas.microsoft.com/office/powerpoint/2010/main" val="1184394143"/>
       </p:ext>
     </p:extLst>
   </p:cSld>
@@ -2471,7 +2738,7 @@
     </p:spTree>
     <p:extLst>
       <p:ext uri="{BB962C8B-B14F-4D97-AF65-F5344CB8AC3E}">
-        <p14:creationId xmlns:p14="http://schemas.microsoft.com/office/powerpoint/2010/main" val="1184394143"/>
+        <p14:creationId xmlns:p14="http://schemas.microsoft.com/office/powerpoint/2010/main" val="2623181828"/>
       </p:ext>
     </p:extLst>
   </p:cSld>
@@ -2572,7 +2839,7 @@
     </p:spTree>
     <p:extLst>
       <p:ext uri="{BB962C8B-B14F-4D97-AF65-F5344CB8AC3E}">
-        <p14:creationId xmlns:p14="http://schemas.microsoft.com/office/powerpoint/2010/main" val="2623181828"/>
+        <p14:creationId xmlns:p14="http://schemas.microsoft.com/office/powerpoint/2010/main" val="3054898710"/>
       </p:ext>
     </p:extLst>
   </p:cSld>
@@ -2673,7 +2940,7 @@
     </p:spTree>
     <p:extLst>
       <p:ext uri="{BB962C8B-B14F-4D97-AF65-F5344CB8AC3E}">
-        <p14:creationId xmlns:p14="http://schemas.microsoft.com/office/powerpoint/2010/main" val="3054898710"/>
+        <p14:creationId xmlns:p14="http://schemas.microsoft.com/office/powerpoint/2010/main" val="144330418"/>
       </p:ext>
     </p:extLst>
   </p:cSld>
@@ -2732,6 +2999,96 @@
           <a:lstStyle/>
           <a:p>
             <a:pPr lvl="1"/>
+            <a:r>
+              <a:rPr lang="de-DE" noProof="0" dirty="0" err="1"/>
+              <a:t>GridKA</a:t>
+            </a:r>
+            <a:r>
+              <a:rPr lang="de-DE" noProof="0" dirty="0"/>
+              <a:t> Tier 1 </a:t>
+            </a:r>
+            <a:r>
+              <a:rPr lang="de-DE" noProof="0" dirty="0" err="1"/>
+              <a:t>Node</a:t>
+            </a:r>
+            <a:endParaRPr lang="de-DE" noProof="0" dirty="0"/>
+          </a:p>
+          <a:p>
+            <a:pPr lvl="1"/>
+            <a:endParaRPr lang="de-DE" noProof="0" dirty="0"/>
+          </a:p>
+          <a:p>
+            <a:pPr marL="457200" marR="0" lvl="1" indent="0" algn="l" defTabSz="914400" rtl="0" eaLnBrk="0" fontAlgn="base" latinLnBrk="0" hangingPunct="0">
+              <a:lnSpc>
+                <a:spcPct val="100000"/>
+              </a:lnSpc>
+              <a:spcBef>
+                <a:spcPct val="30000"/>
+              </a:spcBef>
+              <a:spcAft>
+                <a:spcPct val="0"/>
+              </a:spcAft>
+              <a:buClrTx/>
+              <a:buSzTx/>
+              <a:buFontTx/>
+              <a:buNone/>
+              <a:tabLst/>
+              <a:defRPr/>
+            </a:pPr>
+            <a:r>
+              <a:rPr lang="de-DE" noProof="0" dirty="0"/>
+              <a:t>Skalierbarkeit</a:t>
+            </a:r>
+          </a:p>
+          <a:p>
+            <a:pPr marL="457200" marR="0" lvl="1" indent="0" algn="l" defTabSz="914400" rtl="0" eaLnBrk="0" fontAlgn="base" latinLnBrk="0" hangingPunct="0">
+              <a:lnSpc>
+                <a:spcPct val="100000"/>
+              </a:lnSpc>
+              <a:spcBef>
+                <a:spcPct val="30000"/>
+              </a:spcBef>
+              <a:spcAft>
+                <a:spcPct val="0"/>
+              </a:spcAft>
+              <a:buClrTx/>
+              <a:buSzTx/>
+              <a:buFontTx/>
+              <a:buNone/>
+              <a:tabLst/>
+              <a:defRPr/>
+            </a:pPr>
+            <a:r>
+              <a:rPr lang="de-DE" noProof="0" dirty="0"/>
+              <a:t>Ausblick auf WLCG</a:t>
+            </a:r>
+          </a:p>
+          <a:p>
+            <a:pPr lvl="1"/>
+            <a:endParaRPr lang="de-DE" noProof="0" dirty="0"/>
+          </a:p>
+          <a:p>
+            <a:pPr lvl="1"/>
+            <a:r>
+              <a:rPr lang="de-DE" noProof="0" dirty="0"/>
+              <a:t>State of the </a:t>
+            </a:r>
+            <a:r>
+              <a:rPr lang="de-DE" noProof="0" dirty="0" err="1"/>
+              <a:t>art</a:t>
+            </a:r>
+            <a:endParaRPr lang="de-DE" noProof="0" dirty="0"/>
+          </a:p>
+          <a:p>
+            <a:pPr lvl="1"/>
+            <a:r>
+              <a:rPr lang="de-DE" dirty="0" err="1"/>
+              <a:t>palladio</a:t>
+            </a:r>
+            <a:endParaRPr lang="de-DE" dirty="0"/>
+          </a:p>
+          <a:p>
+            <a:pPr lvl="1"/>
             <a:endParaRPr lang="de-DE" noProof="0" dirty="0"/>
           </a:p>
         </p:txBody>
@@ -2774,7 +3131,7 @@
     </p:spTree>
     <p:extLst>
       <p:ext uri="{BB962C8B-B14F-4D97-AF65-F5344CB8AC3E}">
-        <p14:creationId xmlns:p14="http://schemas.microsoft.com/office/powerpoint/2010/main" val="144330418"/>
+        <p14:creationId xmlns:p14="http://schemas.microsoft.com/office/powerpoint/2010/main" val="2146316835"/>
       </p:ext>
     </p:extLst>
   </p:cSld>
@@ -2833,73 +3190,6 @@
           <a:lstStyle/>
           <a:p>
             <a:pPr lvl="1"/>
-            <a:r>
-              <a:rPr lang="de-DE" noProof="0" dirty="0" err="1"/>
-              <a:t>GridKA</a:t>
-            </a:r>
-            <a:r>
-              <a:rPr lang="de-DE" noProof="0" dirty="0"/>
-              <a:t> Tier 1 </a:t>
-            </a:r>
-            <a:r>
-              <a:rPr lang="de-DE" noProof="0" dirty="0" err="1"/>
-              <a:t>Node</a:t>
-            </a:r>
-            <a:endParaRPr lang="de-DE" noProof="0" dirty="0"/>
-          </a:p>
-          <a:p>
-            <a:pPr lvl="1"/>
-            <a:endParaRPr lang="de-DE" noProof="0" dirty="0"/>
-          </a:p>
-          <a:p>
-            <a:pPr marL="457200" marR="0" lvl="1" indent="0" algn="l" defTabSz="914400" rtl="0" eaLnBrk="0" fontAlgn="base" latinLnBrk="0" hangingPunct="0">
-              <a:lnSpc>
-                <a:spcPct val="100000"/>
-              </a:lnSpc>
-              <a:spcBef>
-                <a:spcPct val="30000"/>
-              </a:spcBef>
-              <a:spcAft>
-                <a:spcPct val="0"/>
-              </a:spcAft>
-              <a:buClrTx/>
-              <a:buSzTx/>
-              <a:buFontTx/>
-              <a:buNone/>
-              <a:tabLst/>
-              <a:defRPr/>
-            </a:pPr>
-            <a:r>
-              <a:rPr lang="de-DE" noProof="0" dirty="0"/>
-              <a:t>Skalierbarkeit</a:t>
-            </a:r>
-          </a:p>
-          <a:p>
-            <a:pPr lvl="1"/>
-            <a:endParaRPr lang="de-DE" noProof="0" dirty="0"/>
-          </a:p>
-          <a:p>
-            <a:pPr lvl="1"/>
-            <a:r>
-              <a:rPr lang="de-DE" noProof="0" dirty="0"/>
-              <a:t>State of the </a:t>
-            </a:r>
-            <a:r>
-              <a:rPr lang="de-DE" noProof="0" dirty="0" err="1"/>
-              <a:t>art</a:t>
-            </a:r>
-            <a:endParaRPr lang="de-DE" noProof="0" dirty="0"/>
-          </a:p>
-          <a:p>
-            <a:pPr lvl="1"/>
-            <a:r>
-              <a:rPr lang="de-DE" dirty="0" err="1"/>
-              <a:t>palladio</a:t>
-            </a:r>
-            <a:endParaRPr lang="de-DE" dirty="0"/>
-          </a:p>
-          <a:p>
-            <a:pPr lvl="1"/>
             <a:endParaRPr lang="de-DE" noProof="0" dirty="0"/>
           </a:p>
         </p:txBody>
@@ -2942,7 +3232,7 @@
     </p:spTree>
     <p:extLst>
       <p:ext uri="{BB962C8B-B14F-4D97-AF65-F5344CB8AC3E}">
-        <p14:creationId xmlns:p14="http://schemas.microsoft.com/office/powerpoint/2010/main" val="2146316835"/>
+        <p14:creationId xmlns:p14="http://schemas.microsoft.com/office/powerpoint/2010/main" val="839315001"/>
       </p:ext>
     </p:extLst>
   </p:cSld>
@@ -3001,6 +3291,67 @@
           <a:lstStyle/>
           <a:p>
             <a:pPr lvl="1"/>
+            <a:r>
+              <a:rPr lang="de-DE" noProof="0" dirty="0"/>
+              <a:t>Abgegrenzt von </a:t>
+            </a:r>
+            <a:r>
+              <a:rPr lang="de-DE" noProof="0" dirty="0" err="1"/>
+              <a:t>rationalismus</a:t>
+            </a:r>
+            <a:r>
+              <a:rPr lang="de-DE" noProof="0" dirty="0"/>
+              <a:t> und </a:t>
+            </a:r>
+            <a:r>
+              <a:rPr lang="de-DE" noProof="0" dirty="0" err="1"/>
+              <a:t>empirie</a:t>
+            </a:r>
+            <a:endParaRPr lang="de-DE" noProof="0" dirty="0"/>
+          </a:p>
+          <a:p>
+            <a:pPr lvl="1"/>
+            <a:r>
+              <a:rPr lang="de-DE" noProof="0" dirty="0"/>
+              <a:t>Rationalismus: nutze Deduktion um Theorien/Wissen zu bilden (Mathe)</a:t>
+            </a:r>
+          </a:p>
+          <a:p>
+            <a:pPr lvl="1"/>
+            <a:r>
+              <a:rPr lang="de-DE" noProof="0" dirty="0"/>
+              <a:t>Empirie: Nur durch beobachten</a:t>
+            </a:r>
+          </a:p>
+          <a:p>
+            <a:pPr lvl="1"/>
+            <a:r>
+              <a:rPr lang="de-DE" noProof="0" dirty="0"/>
+              <a:t>Popper: was dazwischen gefunden, wissenschaftliche Theorien nie bewiesen, sondern nur </a:t>
+            </a:r>
+            <a:r>
+              <a:rPr lang="de-DE" noProof="0" dirty="0" err="1"/>
+              <a:t>falsiziert</a:t>
+            </a:r>
+            <a:endParaRPr lang="de-DE" noProof="0" dirty="0"/>
+          </a:p>
+          <a:p>
+            <a:pPr lvl="1"/>
+            <a:r>
+              <a:rPr lang="de-DE" noProof="0" dirty="0"/>
+              <a:t>(unterschied zu Rationalismus)</a:t>
+            </a:r>
+          </a:p>
+          <a:p>
+            <a:pPr lvl="1"/>
+            <a:r>
+              <a:rPr lang="de-DE" noProof="0" dirty="0"/>
+              <a:t>Unterschied zu Empirie: Erste entwickelt durch Denken und dann durch Empirie </a:t>
+            </a:r>
+            <a:r>
+              <a:rPr lang="de-DE" noProof="0"/>
+              <a:t>bestätitigenn</a:t>
+            </a:r>
             <a:endParaRPr lang="de-DE" noProof="0" dirty="0"/>
           </a:p>
         </p:txBody>
@@ -3043,7 +3394,7 @@
     </p:spTree>
     <p:extLst>
       <p:ext uri="{BB962C8B-B14F-4D97-AF65-F5344CB8AC3E}">
-        <p14:creationId xmlns:p14="http://schemas.microsoft.com/office/powerpoint/2010/main" val="1662718527"/>
+        <p14:creationId xmlns:p14="http://schemas.microsoft.com/office/powerpoint/2010/main" val="2749926565"/>
       </p:ext>
     </p:extLst>
   </p:cSld>
@@ -5583,7 +5934,7 @@
               <a:pPr>
                 <a:defRPr/>
               </a:pPr>
-              <a:t>29.01.2018</a:t>
+              <a:t>05.02.2018</a:t>
             </a:fld>
             <a:endParaRPr lang="de-DE" sz="1000" dirty="0">
               <a:latin typeface="Arial" pitchFamily="34" charset="0"/>
@@ -6282,10 +6633,9 @@
           <a:lstStyle/>
           <a:p>
             <a:r>
-              <a:rPr lang="de-DE" dirty="0"/>
-              <a:t>Planung – erste 4 Wochen</a:t>
-            </a:r>
-            <a:endParaRPr lang="de-DE" noProof="0" dirty="0"/>
+              <a:rPr lang="de-DE" noProof="0" dirty="0"/>
+              <a:t>Planung – Fall: Palladio skaliert</a:t>
+            </a:r>
           </a:p>
         </p:txBody>
       </p:sp>
@@ -6324,94 +6674,196 @@
           </a:p>
         </p:txBody>
       </p:sp>
-      <p:sp>
-        <p:nvSpPr>
-          <p:cNvPr id="8" name="Inhaltsplatzhalter 7"/>
-          <p:cNvSpPr>
-            <a:spLocks noGrp="1"/>
-          </p:cNvSpPr>
+      <p:pic>
+        <p:nvPicPr>
+          <p:cNvPr id="4" name="Inhaltsplatzhalter 3">
+            <a:extLst>
+              <a:ext uri="{FF2B5EF4-FFF2-40B4-BE49-F238E27FC236}">
+                <a16:creationId xmlns:a16="http://schemas.microsoft.com/office/drawing/2014/main" id="{FB0A7BD2-29DD-4AE6-A61A-BD017FCAB589}"/>
+              </a:ext>
+            </a:extLst>
+          </p:cNvPr>
+          <p:cNvPicPr>
+            <a:picLocks noGrp="1" noChangeAspect="1"/>
+          </p:cNvPicPr>
           <p:nvPr>
             <p:ph idx="1"/>
           </p:nvPr>
-        </p:nvSpPr>
+        </p:nvPicPr>
+        <p:blipFill>
+          <a:blip r:embed="rId3"/>
+          <a:stretch>
+            <a:fillRect/>
+          </a:stretch>
+        </p:blipFill>
         <p:spPr>
           <a:xfrm>
-            <a:off x="390525" y="1600200"/>
-            <a:ext cx="8363231" cy="4204258"/>
+            <a:off x="304800" y="1295400"/>
+            <a:ext cx="8480354" cy="3921422"/>
           </a:xfrm>
-        </p:spPr>
-        <p:txBody>
-          <a:bodyPr/>
-          <a:lstStyle/>
-          <a:p>
-            <a:r>
-              <a:rPr lang="de-DE" noProof="0" dirty="0"/>
-              <a:t>Erhalte initiale Performance-Daten</a:t>
-            </a:r>
-          </a:p>
-          <a:p>
-            <a:r>
-              <a:rPr lang="de-DE" dirty="0"/>
-              <a:t>Erstelle stark vereinfachtes Modell</a:t>
-            </a:r>
-          </a:p>
-          <a:p>
-            <a:r>
-              <a:rPr lang="de-DE" dirty="0"/>
-              <a:t>Erhalte erstes Simulationsergebnis</a:t>
-            </a:r>
-          </a:p>
-          <a:p>
-            <a:r>
-              <a:rPr lang="de-DE" dirty="0"/>
-              <a:t>Validiere Skalierbarkeit von Palladio</a:t>
-            </a:r>
-          </a:p>
-          <a:p>
-            <a:pPr marL="0" indent="0">
+          <a:prstGeom prst="rect">
+            <a:avLst/>
+          </a:prstGeom>
+        </p:spPr>
+      </p:pic>
+      <p:sp>
+        <p:nvSpPr>
+          <p:cNvPr id="2" name="Textfeld 1">
+            <a:extLst>
+              <a:ext uri="{FF2B5EF4-FFF2-40B4-BE49-F238E27FC236}">
+                <a16:creationId xmlns:a16="http://schemas.microsoft.com/office/drawing/2014/main" id="{AD5070B2-2EFA-4556-8E95-4A66FADEDDC8}"/>
+              </a:ext>
+            </a:extLst>
+          </p:cNvPr>
+          <p:cNvSpPr txBox="1"/>
+          <p:nvPr/>
+        </p:nvSpPr>
+        <p:spPr>
+          <a:xfrm>
+            <a:off x="2920617" y="5216822"/>
+            <a:ext cx="1635384" cy="338554"/>
+          </a:xfrm>
+          <a:prstGeom prst="rect">
+            <a:avLst/>
+          </a:prstGeom>
+          <a:noFill/>
+        </p:spPr>
+        <p:txBody>
+          <a:bodyPr wrap="none" rtlCol="0">
+            <a:spAutoFit/>
+          </a:bodyPr>
+          <a:lstStyle/>
+          <a:p>
+            <a:r>
+              <a:rPr lang="de-DE" sz="1600" dirty="0"/>
+              <a:t>(Martens, 2008)</a:t>
+            </a:r>
+          </a:p>
+        </p:txBody>
+      </p:sp>
+      <p:sp>
+        <p:nvSpPr>
+          <p:cNvPr id="3" name="Rectangle 1">
+            <a:extLst>
+              <a:ext uri="{FF2B5EF4-FFF2-40B4-BE49-F238E27FC236}">
+                <a16:creationId xmlns:a16="http://schemas.microsoft.com/office/drawing/2014/main" id="{227F0262-C7F8-46C1-B3AA-08AA10D0EFBB}"/>
+              </a:ext>
+            </a:extLst>
+          </p:cNvPr>
+          <p:cNvSpPr>
+            <a:spLocks noChangeArrowheads="1"/>
+          </p:cNvSpPr>
+          <p:nvPr/>
+        </p:nvSpPr>
+        <p:spPr bwMode="auto">
+          <a:xfrm>
+            <a:off x="0" y="0"/>
+            <a:ext cx="9144000" cy="457200"/>
+          </a:xfrm>
+          <a:prstGeom prst="rect">
+            <a:avLst/>
+          </a:prstGeom>
+          <a:noFill/>
+          <a:ln>
+            <a:noFill/>
+          </a:ln>
+          <a:effectLst/>
+          <a:extLst>
+            <a:ext uri="{909E8E84-426E-40DD-AFC4-6F175D3DCCD1}">
+              <a14:hiddenFill xmlns:a14="http://schemas.microsoft.com/office/drawing/2010/main">
+                <a:solidFill>
+                  <a:schemeClr val="accent1"/>
+                </a:solidFill>
+              </a14:hiddenFill>
+            </a:ext>
+            <a:ext uri="{91240B29-F687-4F45-9708-019B960494DF}">
+              <a14:hiddenLine xmlns:a14="http://schemas.microsoft.com/office/drawing/2010/main" w="9525">
+                <a:solidFill>
+                  <a:schemeClr val="tx1"/>
+                </a:solidFill>
+                <a:miter lim="800000"/>
+                <a:headEnd/>
+                <a:tailEnd/>
+              </a14:hiddenLine>
+            </a:ext>
+            <a:ext uri="{AF507438-7753-43E0-B8FC-AC1667EBCBE1}">
+              <a14:hiddenEffects xmlns:a14="http://schemas.microsoft.com/office/drawing/2010/main">
+                <a:effectLst>
+                  <a:outerShdw dist="35921" dir="2700000" algn="ctr" rotWithShape="0">
+                    <a:schemeClr val="bg2"/>
+                  </a:outerShdw>
+                </a:effectLst>
+              </a14:hiddenEffects>
+            </a:ext>
+          </a:extLst>
+        </p:spPr>
+        <p:txBody>
+          <a:bodyPr vert="horz" wrap="none" lIns="91440" tIns="45720" rIns="91440" bIns="45720" numCol="1" anchor="ctr" anchorCtr="0" compatLnSpc="1">
+            <a:prstTxWarp prst="textNoShape">
+              <a:avLst/>
+            </a:prstTxWarp>
+            <a:spAutoFit/>
+          </a:bodyPr>
+          <a:lstStyle/>
+          <a:p>
+            <a:pPr marL="0" marR="0" lvl="0" indent="0" algn="l" defTabSz="914400" rtl="0" eaLnBrk="0" fontAlgn="base" latinLnBrk="0" hangingPunct="0">
+              <a:lnSpc>
+                <a:spcPct val="100000"/>
+              </a:lnSpc>
+              <a:spcBef>
+                <a:spcPct val="0"/>
+              </a:spcBef>
+              <a:spcAft>
+                <a:spcPct val="0"/>
+              </a:spcAft>
+              <a:buClrTx/>
+              <a:buSzTx/>
+              <a:buFontTx/>
               <a:buNone/>
+              <a:tabLst/>
             </a:pPr>
-            <a:endParaRPr lang="de-DE" dirty="0"/>
-          </a:p>
-          <a:p>
-            <a:pPr marL="0" indent="0">
-              <a:buNone/>
-            </a:pPr>
-            <a:endParaRPr lang="de-DE" noProof="0" dirty="0"/>
-          </a:p>
-          <a:p>
-            <a:pPr marL="0" indent="0">
-              <a:buNone/>
-            </a:pPr>
-            <a:endParaRPr lang="de-DE" noProof="0" dirty="0"/>
-          </a:p>
-          <a:p>
-            <a:pPr marL="0" indent="0">
-              <a:buNone/>
-            </a:pPr>
-            <a:endParaRPr lang="de-DE" noProof="0" dirty="0"/>
-          </a:p>
-          <a:p>
-            <a:pPr marL="0" indent="0">
-              <a:buNone/>
-            </a:pPr>
-            <a:endParaRPr lang="de-DE" noProof="0" dirty="0"/>
-          </a:p>
-          <a:p>
-            <a:pPr marL="394575" lvl="1" indent="0">
-              <a:buNone/>
-            </a:pPr>
-            <a:r>
-              <a:rPr lang="de-DE" noProof="0" dirty="0"/>
-              <a:t>	</a:t>
-            </a:r>
+            <a:r>
+              <a:rPr kumimoji="0" lang="de-DE" altLang="de-DE" sz="1000" b="0" i="0" u="none" strike="noStrike" cap="none" normalizeH="0" baseline="0">
+                <a:ln>
+                  <a:noFill/>
+                </a:ln>
+                <a:solidFill>
+                  <a:schemeClr val="tx1"/>
+                </a:solidFill>
+                <a:effectLst/>
+                <a:latin typeface="Arial Unicode MS" panose="020B0604020202020204" pitchFamily="34" charset="-128"/>
+              </a:rPr>
+              <a:t>Anne Martens, Exposé zum Promotionsvorhaben, 2008</a:t>
+            </a:r>
+            <a:r>
+              <a:rPr kumimoji="0" lang="de-DE" altLang="de-DE" sz="600" b="0" i="0" u="none" strike="noStrike" cap="none" normalizeH="0" baseline="0">
+                <a:ln>
+                  <a:noFill/>
+                </a:ln>
+                <a:solidFill>
+                  <a:schemeClr val="tx1"/>
+                </a:solidFill>
+                <a:effectLst/>
+              </a:rPr>
+              <a:t> </a:t>
+            </a:r>
+            <a:endParaRPr kumimoji="0" lang="de-DE" altLang="de-DE" sz="1800" b="0" i="0" u="none" strike="noStrike" cap="none" normalizeH="0" baseline="0">
+              <a:ln>
+                <a:noFill/>
+              </a:ln>
+              <a:solidFill>
+                <a:schemeClr val="tx1"/>
+              </a:solidFill>
+              <a:effectLst/>
+              <a:latin typeface="Arial" panose="020B0604020202020204" pitchFamily="34" charset="0"/>
+            </a:endParaRPr>
           </a:p>
         </p:txBody>
       </p:sp>
     </p:spTree>
     <p:extLst>
       <p:ext uri="{BB962C8B-B14F-4D97-AF65-F5344CB8AC3E}">
-        <p14:creationId xmlns:p14="http://schemas.microsoft.com/office/powerpoint/2010/main" val="2829617523"/>
+        <p14:creationId xmlns:p14="http://schemas.microsoft.com/office/powerpoint/2010/main" val="89989442"/>
       </p:ext>
     </p:extLst>
   </p:cSld>
@@ -6517,28 +6969,39 @@
           <a:p>
             <a:r>
               <a:rPr lang="de-DE" dirty="0"/>
-              <a:t>Verbessere das Modell iterativ: </a:t>
+              <a:t>Mögliche Verbesserungen des Modells</a:t>
             </a:r>
           </a:p>
           <a:p>
             <a:pPr lvl="1"/>
             <a:r>
               <a:rPr lang="de-DE" dirty="0"/>
-              <a:t>Verfeinere Performance Daten</a:t>
+              <a:t>Ressourcennutzung durch andere Experimente</a:t>
             </a:r>
           </a:p>
           <a:p>
             <a:pPr lvl="1"/>
             <a:r>
               <a:rPr lang="de-DE" dirty="0"/>
-              <a:t>Verfeinere Modell</a:t>
+              <a:t>Datenübertragung von und zu anderen Rechenzentren</a:t>
             </a:r>
           </a:p>
           <a:p>
             <a:pPr lvl="1"/>
             <a:r>
               <a:rPr lang="de-DE" dirty="0"/>
-              <a:t>Validiere Simulationsergebnisse</a:t>
+              <a:t>Individuellen Phasen eines Jobs</a:t>
+            </a:r>
+          </a:p>
+          <a:p>
+            <a:pPr lvl="1"/>
+            <a:r>
+              <a:rPr lang="de-DE" dirty="0" err="1"/>
+              <a:t>Jobslots</a:t>
+            </a:r>
+            <a:r>
+              <a:rPr lang="de-DE" dirty="0"/>
+              <a:t> der Working Nodes </a:t>
             </a:r>
           </a:p>
           <a:p>
@@ -6546,12 +7009,6 @@
               <a:buNone/>
             </a:pPr>
             <a:endParaRPr lang="de-DE" dirty="0"/>
-          </a:p>
-          <a:p>
-            <a:r>
-              <a:rPr lang="de-DE" dirty="0"/>
-              <a:t>Abschließende Validierung </a:t>
-            </a:r>
           </a:p>
           <a:p>
             <a:pPr marL="0" indent="0">
@@ -7258,7 +7715,7 @@
           <a:p>
             <a:r>
               <a:rPr lang="de-DE" sz="2000" dirty="0"/>
-              <a:t>[5] Steen Becker, Heiko </a:t>
+              <a:t>[5] Steffen Becker, Heiko </a:t>
             </a:r>
             <a:r>
               <a:rPr lang="de-DE" sz="2000" dirty="0" err="1"/>
@@ -7346,7 +7803,24 @@
             </a:r>
             <a:r>
               <a:rPr lang="de-DE" sz="2000" dirty="0"/>
-              <a:t>: 0164-1212.doi: https://doi.org/10.1016/j.jss.2008.03.066. url: http://www.sciencedirect.com/science/article/pii/S0164121208001015</a:t>
+              <a:t>: 0164-1212.doi: https://doi.org/10.1016/j.jss.2008.03.066. url: </a:t>
+            </a:r>
+            <a:r>
+              <a:rPr lang="de-DE" sz="2000" dirty="0">
+                <a:hlinkClick r:id="rId3"/>
+              </a:rPr>
+              <a:t>http://www.sciencedirect.com/science/article/pii/S0164121208001015</a:t>
+            </a:r>
+            <a:endParaRPr lang="de-DE" sz="2000" dirty="0"/>
+          </a:p>
+          <a:p>
+            <a:r>
+              <a:rPr lang="de-DE" sz="2000" noProof="0" dirty="0"/>
+              <a:t>Anne Martens, Exposé </a:t>
+            </a:r>
+            <a:r>
+              <a:rPr lang="de-DE" sz="2000" noProof="0"/>
+              <a:t>zum Promotionsvorhaben, 2008</a:t>
             </a:r>
             <a:endParaRPr lang="de-DE" sz="2000" noProof="0" dirty="0"/>
           </a:p>
@@ -7914,7 +8388,7 @@
 </p:sld>
 </file>
 
-<file path=ppt/slides/slide2.xml><?xml version="1.0" encoding="utf-8"?>
+<file path=ppt/slides/slide19.xml><?xml version="1.0" encoding="utf-8"?>
 <p:sld xmlns:a="http://schemas.openxmlformats.org/drawingml/2006/main" xmlns:r="http://schemas.openxmlformats.org/officeDocument/2006/relationships" xmlns:p="http://schemas.openxmlformats.org/presentationml/2006/main">
   <p:cSld>
     <p:spTree>
@@ -7955,56 +8429,6 @@
       </p:sp>
       <p:sp>
         <p:nvSpPr>
-          <p:cNvPr id="3" name="Inhaltsplatzhalter 2"/>
-          <p:cNvSpPr>
-            <a:spLocks noGrp="1"/>
-          </p:cNvSpPr>
-          <p:nvPr>
-            <p:ph idx="1"/>
-          </p:nvPr>
-        </p:nvSpPr>
-        <p:spPr>
-          <a:xfrm>
-            <a:off x="390525" y="1286290"/>
-            <a:ext cx="8356600" cy="4745037"/>
-          </a:xfrm>
-        </p:spPr>
-        <p:txBody>
-          <a:bodyPr/>
-          <a:lstStyle/>
-          <a:p>
-            <a:r>
-              <a:rPr lang="de-DE" noProof="0" dirty="0"/>
-              <a:t>LHC am CERN erzeugt 50 </a:t>
-            </a:r>
-            <a:r>
-              <a:rPr lang="de-DE" noProof="0" dirty="0" err="1"/>
-              <a:t>Petabyte</a:t>
-            </a:r>
-            <a:r>
-              <a:rPr lang="de-DE" noProof="0" dirty="0"/>
-              <a:t> Daten</a:t>
-            </a:r>
-          </a:p>
-          <a:p>
-            <a:r>
-              <a:rPr lang="de-DE" noProof="0" dirty="0"/>
-              <a:t>WLCG verarbeitet Daten</a:t>
-            </a:r>
-          </a:p>
-          <a:p>
-            <a:r>
-              <a:rPr lang="de-DE" noProof="0" dirty="0"/>
-              <a:t>Entdeckte Higgs Boson 2012 </a:t>
-            </a:r>
-          </a:p>
-          <a:p>
-            <a:endParaRPr lang="de-DE" noProof="0" dirty="0"/>
-          </a:p>
-        </p:txBody>
-      </p:sp>
-      <p:sp>
-        <p:nvSpPr>
           <p:cNvPr id="17412" name="Fußzeilenplatzhalter 3"/>
           <p:cNvSpPr>
             <a:spLocks noGrp="1"/>
@@ -8038,150 +8462,6 @@
           </a:p>
         </p:txBody>
       </p:sp>
-      <p:pic>
-        <p:nvPicPr>
-          <p:cNvPr id="2" name="Grafik 1"/>
-          <p:cNvPicPr>
-            <a:picLocks noChangeAspect="1"/>
-          </p:cNvPicPr>
-          <p:nvPr/>
-        </p:nvPicPr>
-        <p:blipFill>
-          <a:blip r:embed="rId3"/>
-          <a:stretch>
-            <a:fillRect/>
-          </a:stretch>
-        </p:blipFill>
-        <p:spPr>
-          <a:xfrm>
-            <a:off x="533400" y="3164417"/>
-            <a:ext cx="7264251" cy="2743200"/>
-          </a:xfrm>
-          <a:prstGeom prst="rect">
-            <a:avLst/>
-          </a:prstGeom>
-        </p:spPr>
-      </p:pic>
-      <p:sp>
-        <p:nvSpPr>
-          <p:cNvPr id="4" name="Textfeld 3"/>
-          <p:cNvSpPr txBox="1"/>
-          <p:nvPr/>
-        </p:nvSpPr>
-        <p:spPr>
-          <a:xfrm>
-            <a:off x="2312423" y="5877481"/>
-            <a:ext cx="4515980" cy="369332"/>
-          </a:xfrm>
-          <a:prstGeom prst="rect">
-            <a:avLst/>
-          </a:prstGeom>
-          <a:noFill/>
-        </p:spPr>
-        <p:txBody>
-          <a:bodyPr wrap="none" rtlCol="0">
-            <a:spAutoFit/>
-          </a:bodyPr>
-          <a:lstStyle/>
-          <a:p>
-            <a:r>
-              <a:rPr lang="de-DE" dirty="0"/>
-              <a:t>Sites des WLCG </a:t>
-            </a:r>
-            <a:r>
-              <a:rPr lang="de-DE" sz="1400" dirty="0"/>
-              <a:t>(http://wlcg-public.web.cern.ch/)</a:t>
-            </a:r>
-          </a:p>
-        </p:txBody>
-      </p:sp>
-    </p:spTree>
-    <p:extLst>
-      <p:ext uri="{BB962C8B-B14F-4D97-AF65-F5344CB8AC3E}">
-        <p14:creationId xmlns:p14="http://schemas.microsoft.com/office/powerpoint/2010/main" val="2577488338"/>
-      </p:ext>
-    </p:extLst>
-  </p:cSld>
-  <p:clrMapOvr>
-    <a:masterClrMapping/>
-  </p:clrMapOvr>
-</p:sld>
-</file>
-
-<file path=ppt/slides/slide3.xml><?xml version="1.0" encoding="utf-8"?>
-<p:sld xmlns:a="http://schemas.openxmlformats.org/drawingml/2006/main" xmlns:r="http://schemas.openxmlformats.org/officeDocument/2006/relationships" xmlns:p="http://schemas.openxmlformats.org/presentationml/2006/main">
-  <p:cSld>
-    <p:spTree>
-      <p:nvGrpSpPr>
-        <p:cNvPr id="1" name=""/>
-        <p:cNvGrpSpPr/>
-        <p:nvPr/>
-      </p:nvGrpSpPr>
-      <p:grpSpPr>
-        <a:xfrm>
-          <a:off x="0" y="0"/>
-          <a:ext cx="0" cy="0"/>
-          <a:chOff x="0" y="0"/>
-          <a:chExt cx="0" cy="0"/>
-        </a:xfrm>
-      </p:grpSpPr>
-      <p:sp>
-        <p:nvSpPr>
-          <p:cNvPr id="17409" name="Titel 1"/>
-          <p:cNvSpPr>
-            <a:spLocks noGrp="1"/>
-          </p:cNvSpPr>
-          <p:nvPr>
-            <p:ph type="title"/>
-          </p:nvPr>
-        </p:nvSpPr>
-        <p:spPr/>
-        <p:txBody>
-          <a:bodyPr/>
-          <a:lstStyle/>
-          <a:p>
-            <a:r>
-              <a:rPr lang="de-DE" noProof="0" dirty="0"/>
-              <a:t>Motivation</a:t>
-            </a:r>
-          </a:p>
-        </p:txBody>
-      </p:sp>
-      <p:sp>
-        <p:nvSpPr>
-          <p:cNvPr id="17412" name="Fußzeilenplatzhalter 3"/>
-          <p:cNvSpPr>
-            <a:spLocks noGrp="1"/>
-          </p:cNvSpPr>
-          <p:nvPr>
-            <p:ph type="ftr" sz="quarter" idx="10"/>
-          </p:nvPr>
-        </p:nvSpPr>
-        <p:spPr>
-          <a:noFill/>
-        </p:spPr>
-        <p:txBody>
-          <a:bodyPr/>
-          <a:lstStyle/>
-          <a:p>
-            <a:r>
-              <a:rPr lang="de-DE" dirty="0">
-                <a:latin typeface="Arial" charset="0"/>
-                <a:cs typeface="Arial" charset="0"/>
-              </a:rPr>
-              <a:t>Firnkes Patrick:</a:t>
-            </a:r>
-            <a:r>
-              <a:rPr lang="de-DE" dirty="0"/>
-              <a:t> Modellierung und Simulation von Lastverteilungsstrategien </a:t>
-            </a:r>
-            <a:endParaRPr lang="de-DE" dirty="0">
-              <a:latin typeface="Arial" charset="0"/>
-              <a:cs typeface="Arial" charset="0"/>
-            </a:endParaRPr>
-          </a:p>
-        </p:txBody>
-      </p:sp>
       <p:sp>
         <p:nvSpPr>
           <p:cNvPr id="8" name="Inhaltsplatzhalter 7"/>
@@ -8223,7 +8503,7 @@
             <a:pPr lvl="1"/>
             <a:r>
               <a:rPr lang="de-DE" noProof="0" dirty="0"/>
-              <a:t>Auswirkung von Änderung an der Grid Infrastruktur schwer abschätzbar</a:t>
+              <a:t>Auswirkung von Änderung an der Grid-Infrastruktur schwer abschätzbar</a:t>
             </a:r>
           </a:p>
           <a:p>
@@ -8299,6 +8579,1084 @@
 </p:sld>
 </file>
 
+<file path=ppt/slides/slide2.xml><?xml version="1.0" encoding="utf-8"?>
+<p:sld xmlns:a="http://schemas.openxmlformats.org/drawingml/2006/main" xmlns:r="http://schemas.openxmlformats.org/officeDocument/2006/relationships" xmlns:p="http://schemas.openxmlformats.org/presentationml/2006/main">
+  <p:cSld>
+    <p:spTree>
+      <p:nvGrpSpPr>
+        <p:cNvPr id="1" name=""/>
+        <p:cNvGrpSpPr/>
+        <p:nvPr/>
+      </p:nvGrpSpPr>
+      <p:grpSpPr>
+        <a:xfrm>
+          <a:off x="0" y="0"/>
+          <a:ext cx="0" cy="0"/>
+          <a:chOff x="0" y="0"/>
+          <a:chExt cx="0" cy="0"/>
+        </a:xfrm>
+      </p:grpSpPr>
+      <p:sp>
+        <p:nvSpPr>
+          <p:cNvPr id="17409" name="Titel 1"/>
+          <p:cNvSpPr>
+            <a:spLocks noGrp="1"/>
+          </p:cNvSpPr>
+          <p:nvPr>
+            <p:ph type="title"/>
+          </p:nvPr>
+        </p:nvSpPr>
+        <p:spPr/>
+        <p:txBody>
+          <a:bodyPr/>
+          <a:lstStyle/>
+          <a:p>
+            <a:r>
+              <a:rPr lang="de-DE" noProof="0" dirty="0"/>
+              <a:t>Motivation</a:t>
+            </a:r>
+          </a:p>
+        </p:txBody>
+      </p:sp>
+      <p:sp>
+        <p:nvSpPr>
+          <p:cNvPr id="3" name="Inhaltsplatzhalter 2"/>
+          <p:cNvSpPr>
+            <a:spLocks noGrp="1"/>
+          </p:cNvSpPr>
+          <p:nvPr>
+            <p:ph idx="1"/>
+          </p:nvPr>
+        </p:nvSpPr>
+        <p:spPr>
+          <a:xfrm>
+            <a:off x="390525" y="1286290"/>
+            <a:ext cx="8356600" cy="4745037"/>
+          </a:xfrm>
+        </p:spPr>
+        <p:txBody>
+          <a:bodyPr/>
+          <a:lstStyle/>
+          <a:p>
+            <a:r>
+              <a:rPr lang="de-DE" noProof="0" dirty="0"/>
+              <a:t>LHC erzeugt 50 Petabyte Daten</a:t>
+            </a:r>
+          </a:p>
+          <a:p>
+            <a:r>
+              <a:rPr lang="de-DE" noProof="0"/>
+              <a:t>WLCG </a:t>
+            </a:r>
+            <a:r>
+              <a:rPr lang="de-DE" noProof="0" dirty="0"/>
+              <a:t>verarbeitet Daten</a:t>
+            </a:r>
+          </a:p>
+          <a:p>
+            <a:r>
+              <a:rPr lang="de-DE" dirty="0"/>
+              <a:t>Lastverteilung nicht optimal </a:t>
+            </a:r>
+            <a:r>
+              <a:rPr lang="de-DE" sz="2000" dirty="0"/>
+              <a:t>(Zach et al., 2011)</a:t>
+            </a:r>
+          </a:p>
+          <a:p>
+            <a:pPr marL="0" indent="0">
+              <a:buNone/>
+            </a:pPr>
+            <a:endParaRPr lang="de-DE" noProof="0" dirty="0"/>
+          </a:p>
+        </p:txBody>
+      </p:sp>
+      <p:sp>
+        <p:nvSpPr>
+          <p:cNvPr id="17412" name="Fußzeilenplatzhalter 3"/>
+          <p:cNvSpPr>
+            <a:spLocks noGrp="1"/>
+          </p:cNvSpPr>
+          <p:nvPr>
+            <p:ph type="ftr" sz="quarter" idx="10"/>
+          </p:nvPr>
+        </p:nvSpPr>
+        <p:spPr>
+          <a:noFill/>
+        </p:spPr>
+        <p:txBody>
+          <a:bodyPr/>
+          <a:lstStyle/>
+          <a:p>
+            <a:r>
+              <a:rPr lang="de-DE" dirty="0">
+                <a:latin typeface="Arial" charset="0"/>
+                <a:cs typeface="Arial" charset="0"/>
+              </a:rPr>
+              <a:t>Firnkes Patrick:</a:t>
+            </a:r>
+            <a:r>
+              <a:rPr lang="de-DE" dirty="0"/>
+              <a:t> Modellierung und Simulation von Lastverteilungsstrategien </a:t>
+            </a:r>
+            <a:endParaRPr lang="de-DE" dirty="0">
+              <a:latin typeface="Arial" charset="0"/>
+              <a:cs typeface="Arial" charset="0"/>
+            </a:endParaRPr>
+          </a:p>
+        </p:txBody>
+      </p:sp>
+      <p:pic>
+        <p:nvPicPr>
+          <p:cNvPr id="2" name="Grafik 1"/>
+          <p:cNvPicPr>
+            <a:picLocks noChangeAspect="1"/>
+          </p:cNvPicPr>
+          <p:nvPr/>
+        </p:nvPicPr>
+        <p:blipFill>
+          <a:blip r:embed="rId3"/>
+          <a:stretch>
+            <a:fillRect/>
+          </a:stretch>
+        </p:blipFill>
+        <p:spPr>
+          <a:xfrm>
+            <a:off x="533400" y="3164417"/>
+            <a:ext cx="7264251" cy="2743200"/>
+          </a:xfrm>
+          <a:prstGeom prst="rect">
+            <a:avLst/>
+          </a:prstGeom>
+        </p:spPr>
+      </p:pic>
+      <p:sp>
+        <p:nvSpPr>
+          <p:cNvPr id="4" name="Textfeld 3"/>
+          <p:cNvSpPr txBox="1"/>
+          <p:nvPr/>
+        </p:nvSpPr>
+        <p:spPr>
+          <a:xfrm>
+            <a:off x="2312423" y="5877481"/>
+            <a:ext cx="4515980" cy="369332"/>
+          </a:xfrm>
+          <a:prstGeom prst="rect">
+            <a:avLst/>
+          </a:prstGeom>
+          <a:noFill/>
+        </p:spPr>
+        <p:txBody>
+          <a:bodyPr wrap="none" rtlCol="0">
+            <a:spAutoFit/>
+          </a:bodyPr>
+          <a:lstStyle/>
+          <a:p>
+            <a:r>
+              <a:rPr lang="de-DE" dirty="0"/>
+              <a:t>Sites des WLCG </a:t>
+            </a:r>
+            <a:r>
+              <a:rPr lang="de-DE" sz="1400" dirty="0"/>
+              <a:t>(http://wlcg-public.web.cern.ch/)</a:t>
+            </a:r>
+          </a:p>
+        </p:txBody>
+      </p:sp>
+    </p:spTree>
+    <p:extLst>
+      <p:ext uri="{BB962C8B-B14F-4D97-AF65-F5344CB8AC3E}">
+        <p14:creationId xmlns:p14="http://schemas.microsoft.com/office/powerpoint/2010/main" val="2577488338"/>
+      </p:ext>
+    </p:extLst>
+  </p:cSld>
+  <p:clrMapOvr>
+    <a:masterClrMapping/>
+  </p:clrMapOvr>
+</p:sld>
+</file>
+
+<file path=ppt/slides/slide20.xml><?xml version="1.0" encoding="utf-8"?>
+<p:sld xmlns:a="http://schemas.openxmlformats.org/drawingml/2006/main" xmlns:r="http://schemas.openxmlformats.org/officeDocument/2006/relationships" xmlns:p="http://schemas.openxmlformats.org/presentationml/2006/main">
+  <p:cSld>
+    <p:spTree>
+      <p:nvGrpSpPr>
+        <p:cNvPr id="1" name=""/>
+        <p:cNvGrpSpPr/>
+        <p:nvPr/>
+      </p:nvGrpSpPr>
+      <p:grpSpPr>
+        <a:xfrm>
+          <a:off x="0" y="0"/>
+          <a:ext cx="0" cy="0"/>
+          <a:chOff x="0" y="0"/>
+          <a:chExt cx="0" cy="0"/>
+        </a:xfrm>
+      </p:grpSpPr>
+      <p:sp>
+        <p:nvSpPr>
+          <p:cNvPr id="17409" name="Titel 1"/>
+          <p:cNvSpPr>
+            <a:spLocks noGrp="1"/>
+          </p:cNvSpPr>
+          <p:nvPr>
+            <p:ph type="title"/>
+          </p:nvPr>
+        </p:nvSpPr>
+        <p:spPr/>
+        <p:txBody>
+          <a:bodyPr/>
+          <a:lstStyle/>
+          <a:p>
+            <a:r>
+              <a:rPr lang="de-DE" noProof="0" dirty="0"/>
+              <a:t>Planung – Fall: Palladio skaliert</a:t>
+            </a:r>
+          </a:p>
+        </p:txBody>
+      </p:sp>
+      <p:sp>
+        <p:nvSpPr>
+          <p:cNvPr id="17412" name="Fußzeilenplatzhalter 3"/>
+          <p:cNvSpPr>
+            <a:spLocks noGrp="1"/>
+          </p:cNvSpPr>
+          <p:nvPr>
+            <p:ph type="ftr" sz="quarter" idx="10"/>
+          </p:nvPr>
+        </p:nvSpPr>
+        <p:spPr>
+          <a:noFill/>
+        </p:spPr>
+        <p:txBody>
+          <a:bodyPr/>
+          <a:lstStyle/>
+          <a:p>
+            <a:r>
+              <a:rPr lang="de-DE" dirty="0">
+                <a:latin typeface="Arial" charset="0"/>
+                <a:cs typeface="Arial" charset="0"/>
+              </a:rPr>
+              <a:t>Firnkes Patrick:</a:t>
+            </a:r>
+            <a:r>
+              <a:rPr lang="de-DE" dirty="0"/>
+              <a:t> Modellierung und Simulation von Lastverteilungsstrategien </a:t>
+            </a:r>
+            <a:endParaRPr lang="de-DE" dirty="0">
+              <a:latin typeface="Arial" charset="0"/>
+              <a:cs typeface="Arial" charset="0"/>
+            </a:endParaRPr>
+          </a:p>
+        </p:txBody>
+      </p:sp>
+      <p:sp>
+        <p:nvSpPr>
+          <p:cNvPr id="5" name="Rechteck: abgerundete Ecken 4">
+            <a:extLst>
+              <a:ext uri="{FF2B5EF4-FFF2-40B4-BE49-F238E27FC236}">
+                <a16:creationId xmlns:a16="http://schemas.microsoft.com/office/drawing/2014/main" id="{436286A3-B74F-43CE-9171-275444385E85}"/>
+              </a:ext>
+            </a:extLst>
+          </p:cNvPr>
+          <p:cNvSpPr/>
+          <p:nvPr/>
+        </p:nvSpPr>
+        <p:spPr>
+          <a:xfrm>
+            <a:off x="5626100" y="1600200"/>
+            <a:ext cx="1676400" cy="914400"/>
+          </a:xfrm>
+          <a:prstGeom prst="roundRect">
+            <a:avLst/>
+          </a:prstGeom>
+        </p:spPr>
+        <p:style>
+          <a:lnRef idx="2">
+            <a:schemeClr val="accent1">
+              <a:shade val="50000"/>
+            </a:schemeClr>
+          </a:lnRef>
+          <a:fillRef idx="1">
+            <a:schemeClr val="accent1"/>
+          </a:fillRef>
+          <a:effectRef idx="0">
+            <a:schemeClr val="accent1"/>
+          </a:effectRef>
+          <a:fontRef idx="minor">
+            <a:schemeClr val="lt1"/>
+          </a:fontRef>
+        </p:style>
+        <p:txBody>
+          <a:bodyPr rtlCol="0" anchor="ctr"/>
+          <a:lstStyle/>
+          <a:p>
+            <a:pPr algn="ctr"/>
+            <a:r>
+              <a:rPr lang="de-DE" dirty="0"/>
+              <a:t>Erhalte Performance Vorhersage</a:t>
+            </a:r>
+          </a:p>
+        </p:txBody>
+      </p:sp>
+      <p:sp>
+        <p:nvSpPr>
+          <p:cNvPr id="9" name="Rechteck: abgerundete Ecken 8">
+            <a:extLst>
+              <a:ext uri="{FF2B5EF4-FFF2-40B4-BE49-F238E27FC236}">
+                <a16:creationId xmlns:a16="http://schemas.microsoft.com/office/drawing/2014/main" id="{DE3C9246-B593-43E3-9F33-7024EE9FA02E}"/>
+              </a:ext>
+            </a:extLst>
+          </p:cNvPr>
+          <p:cNvSpPr/>
+          <p:nvPr/>
+        </p:nvSpPr>
+        <p:spPr>
+          <a:xfrm>
+            <a:off x="2044700" y="1603497"/>
+            <a:ext cx="1676400" cy="914400"/>
+          </a:xfrm>
+          <a:prstGeom prst="roundRect">
+            <a:avLst/>
+          </a:prstGeom>
+        </p:spPr>
+        <p:style>
+          <a:lnRef idx="2">
+            <a:schemeClr val="accent1">
+              <a:shade val="50000"/>
+            </a:schemeClr>
+          </a:lnRef>
+          <a:fillRef idx="1">
+            <a:schemeClr val="accent1"/>
+          </a:fillRef>
+          <a:effectRef idx="0">
+            <a:schemeClr val="accent1"/>
+          </a:effectRef>
+          <a:fontRef idx="minor">
+            <a:schemeClr val="lt1"/>
+          </a:fontRef>
+        </p:style>
+        <p:txBody>
+          <a:bodyPr rtlCol="0" anchor="ctr"/>
+          <a:lstStyle/>
+          <a:p>
+            <a:pPr algn="ctr"/>
+            <a:endParaRPr lang="de-DE" dirty="0"/>
+          </a:p>
+          <a:p>
+            <a:pPr algn="ctr"/>
+            <a:r>
+              <a:rPr lang="de-DE" dirty="0"/>
+              <a:t>Verbessere Modell</a:t>
+            </a:r>
+          </a:p>
+          <a:p>
+            <a:pPr algn="ctr"/>
+            <a:endParaRPr lang="de-DE" dirty="0"/>
+          </a:p>
+        </p:txBody>
+      </p:sp>
+      <p:sp>
+        <p:nvSpPr>
+          <p:cNvPr id="10" name="Rechteck: abgerundete Ecken 9">
+            <a:extLst>
+              <a:ext uri="{FF2B5EF4-FFF2-40B4-BE49-F238E27FC236}">
+                <a16:creationId xmlns:a16="http://schemas.microsoft.com/office/drawing/2014/main" id="{000434D4-0D8D-4843-9371-74B24A4CBF49}"/>
+              </a:ext>
+            </a:extLst>
+          </p:cNvPr>
+          <p:cNvSpPr/>
+          <p:nvPr/>
+        </p:nvSpPr>
+        <p:spPr>
+          <a:xfrm>
+            <a:off x="5549900" y="3817008"/>
+            <a:ext cx="1892300" cy="960047"/>
+          </a:xfrm>
+          <a:prstGeom prst="roundRect">
+            <a:avLst/>
+          </a:prstGeom>
+        </p:spPr>
+        <p:style>
+          <a:lnRef idx="2">
+            <a:schemeClr val="accent1">
+              <a:shade val="50000"/>
+            </a:schemeClr>
+          </a:lnRef>
+          <a:fillRef idx="1">
+            <a:schemeClr val="accent1"/>
+          </a:fillRef>
+          <a:effectRef idx="0">
+            <a:schemeClr val="accent1"/>
+          </a:effectRef>
+          <a:fontRef idx="minor">
+            <a:schemeClr val="lt1"/>
+          </a:fontRef>
+        </p:style>
+        <p:txBody>
+          <a:bodyPr rtlCol="0" anchor="ctr"/>
+          <a:lstStyle/>
+          <a:p>
+            <a:pPr algn="ctr"/>
+            <a:r>
+              <a:rPr lang="de-DE" dirty="0"/>
+              <a:t>Vergleiche mit gemessen Daten</a:t>
+            </a:r>
+          </a:p>
+        </p:txBody>
+      </p:sp>
+      <p:sp>
+        <p:nvSpPr>
+          <p:cNvPr id="8" name="Flussdiagramm: Verzweigung 7">
+            <a:extLst>
+              <a:ext uri="{FF2B5EF4-FFF2-40B4-BE49-F238E27FC236}">
+                <a16:creationId xmlns:a16="http://schemas.microsoft.com/office/drawing/2014/main" id="{62283A71-6CC3-473B-A377-499ADE9BB68F}"/>
+              </a:ext>
+            </a:extLst>
+          </p:cNvPr>
+          <p:cNvSpPr/>
+          <p:nvPr/>
+        </p:nvSpPr>
+        <p:spPr>
+          <a:xfrm>
+            <a:off x="2425700" y="3856720"/>
+            <a:ext cx="914400" cy="880622"/>
+          </a:xfrm>
+          <a:prstGeom prst="flowChartDecision">
+            <a:avLst/>
+          </a:prstGeom>
+        </p:spPr>
+        <p:style>
+          <a:lnRef idx="2">
+            <a:schemeClr val="accent1">
+              <a:shade val="50000"/>
+            </a:schemeClr>
+          </a:lnRef>
+          <a:fillRef idx="1">
+            <a:schemeClr val="accent1"/>
+          </a:fillRef>
+          <a:effectRef idx="0">
+            <a:schemeClr val="accent1"/>
+          </a:effectRef>
+          <a:fontRef idx="minor">
+            <a:schemeClr val="lt1"/>
+          </a:fontRef>
+        </p:style>
+        <p:txBody>
+          <a:bodyPr rtlCol="0" anchor="ctr"/>
+          <a:lstStyle/>
+          <a:p>
+            <a:pPr algn="ctr"/>
+            <a:endParaRPr lang="de-DE"/>
+          </a:p>
+        </p:txBody>
+      </p:sp>
+      <p:sp>
+        <p:nvSpPr>
+          <p:cNvPr id="11" name="Flussdiagramm: Verbinder 10">
+            <a:extLst>
+              <a:ext uri="{FF2B5EF4-FFF2-40B4-BE49-F238E27FC236}">
+                <a16:creationId xmlns:a16="http://schemas.microsoft.com/office/drawing/2014/main" id="{A39A4870-086C-4FBE-B9E5-647D2BF7C2D1}"/>
+              </a:ext>
+            </a:extLst>
+          </p:cNvPr>
+          <p:cNvSpPr/>
+          <p:nvPr/>
+        </p:nvSpPr>
+        <p:spPr>
+          <a:xfrm>
+            <a:off x="977900" y="1813524"/>
+            <a:ext cx="523875" cy="487752"/>
+          </a:xfrm>
+          <a:prstGeom prst="flowChartConnector">
+            <a:avLst/>
+          </a:prstGeom>
+        </p:spPr>
+        <p:style>
+          <a:lnRef idx="2">
+            <a:schemeClr val="accent1">
+              <a:shade val="50000"/>
+            </a:schemeClr>
+          </a:lnRef>
+          <a:fillRef idx="1">
+            <a:schemeClr val="accent1"/>
+          </a:fillRef>
+          <a:effectRef idx="0">
+            <a:schemeClr val="accent1"/>
+          </a:effectRef>
+          <a:fontRef idx="minor">
+            <a:schemeClr val="lt1"/>
+          </a:fontRef>
+        </p:style>
+        <p:txBody>
+          <a:bodyPr rtlCol="0" anchor="ctr"/>
+          <a:lstStyle/>
+          <a:p>
+            <a:pPr algn="ctr"/>
+            <a:endParaRPr lang="de-DE"/>
+          </a:p>
+        </p:txBody>
+      </p:sp>
+      <p:cxnSp>
+        <p:nvCxnSpPr>
+          <p:cNvPr id="15" name="Gerade Verbindung mit Pfeil 14">
+            <a:extLst>
+              <a:ext uri="{FF2B5EF4-FFF2-40B4-BE49-F238E27FC236}">
+                <a16:creationId xmlns:a16="http://schemas.microsoft.com/office/drawing/2014/main" id="{81929910-1CE3-4F04-955F-2BD3A015010D}"/>
+              </a:ext>
+            </a:extLst>
+          </p:cNvPr>
+          <p:cNvCxnSpPr>
+            <a:cxnSpLocks/>
+            <a:stCxn id="11" idx="6"/>
+            <a:endCxn id="9" idx="1"/>
+          </p:cNvCxnSpPr>
+          <p:nvPr/>
+        </p:nvCxnSpPr>
+        <p:spPr>
+          <a:xfrm>
+            <a:off x="1501775" y="2057400"/>
+            <a:ext cx="542925" cy="3297"/>
+          </a:xfrm>
+          <a:prstGeom prst="straightConnector1">
+            <a:avLst/>
+          </a:prstGeom>
+          <a:ln w="38100">
+            <a:tailEnd type="triangle"/>
+          </a:ln>
+        </p:spPr>
+        <p:style>
+          <a:lnRef idx="1">
+            <a:schemeClr val="accent1"/>
+          </a:lnRef>
+          <a:fillRef idx="0">
+            <a:schemeClr val="accent1"/>
+          </a:fillRef>
+          <a:effectRef idx="0">
+            <a:schemeClr val="accent1"/>
+          </a:effectRef>
+          <a:fontRef idx="minor">
+            <a:schemeClr val="tx1"/>
+          </a:fontRef>
+        </p:style>
+      </p:cxnSp>
+      <p:cxnSp>
+        <p:nvCxnSpPr>
+          <p:cNvPr id="19" name="Gerade Verbindung mit Pfeil 18">
+            <a:extLst>
+              <a:ext uri="{FF2B5EF4-FFF2-40B4-BE49-F238E27FC236}">
+                <a16:creationId xmlns:a16="http://schemas.microsoft.com/office/drawing/2014/main" id="{4D8DAB5A-913B-40C9-B491-D42E50BA1147}"/>
+              </a:ext>
+            </a:extLst>
+          </p:cNvPr>
+          <p:cNvCxnSpPr>
+            <a:cxnSpLocks/>
+            <a:stCxn id="9" idx="3"/>
+            <a:endCxn id="5" idx="1"/>
+          </p:cNvCxnSpPr>
+          <p:nvPr/>
+        </p:nvCxnSpPr>
+        <p:spPr>
+          <a:xfrm flipV="1">
+            <a:off x="3721100" y="2057400"/>
+            <a:ext cx="1905000" cy="3297"/>
+          </a:xfrm>
+          <a:prstGeom prst="straightConnector1">
+            <a:avLst/>
+          </a:prstGeom>
+          <a:ln w="38100">
+            <a:tailEnd type="triangle"/>
+          </a:ln>
+        </p:spPr>
+        <p:style>
+          <a:lnRef idx="1">
+            <a:schemeClr val="accent1"/>
+          </a:lnRef>
+          <a:fillRef idx="0">
+            <a:schemeClr val="accent1"/>
+          </a:fillRef>
+          <a:effectRef idx="0">
+            <a:schemeClr val="accent1"/>
+          </a:effectRef>
+          <a:fontRef idx="minor">
+            <a:schemeClr val="tx1"/>
+          </a:fontRef>
+        </p:style>
+      </p:cxnSp>
+      <p:cxnSp>
+        <p:nvCxnSpPr>
+          <p:cNvPr id="22" name="Gerade Verbindung mit Pfeil 21">
+            <a:extLst>
+              <a:ext uri="{FF2B5EF4-FFF2-40B4-BE49-F238E27FC236}">
+                <a16:creationId xmlns:a16="http://schemas.microsoft.com/office/drawing/2014/main" id="{E38ED850-B9A6-4525-A4B8-0E28F5D5E713}"/>
+              </a:ext>
+            </a:extLst>
+          </p:cNvPr>
+          <p:cNvCxnSpPr>
+            <a:cxnSpLocks/>
+            <a:stCxn id="5" idx="2"/>
+            <a:endCxn id="10" idx="0"/>
+          </p:cNvCxnSpPr>
+          <p:nvPr/>
+        </p:nvCxnSpPr>
+        <p:spPr>
+          <a:xfrm>
+            <a:off x="6464300" y="2514600"/>
+            <a:ext cx="31750" cy="1302408"/>
+          </a:xfrm>
+          <a:prstGeom prst="straightConnector1">
+            <a:avLst/>
+          </a:prstGeom>
+          <a:ln w="38100">
+            <a:tailEnd type="triangle"/>
+          </a:ln>
+        </p:spPr>
+        <p:style>
+          <a:lnRef idx="1">
+            <a:schemeClr val="accent1"/>
+          </a:lnRef>
+          <a:fillRef idx="0">
+            <a:schemeClr val="accent1"/>
+          </a:fillRef>
+          <a:effectRef idx="0">
+            <a:schemeClr val="accent1"/>
+          </a:effectRef>
+          <a:fontRef idx="minor">
+            <a:schemeClr val="tx1"/>
+          </a:fontRef>
+        </p:style>
+      </p:cxnSp>
+      <p:cxnSp>
+        <p:nvCxnSpPr>
+          <p:cNvPr id="27" name="Gerade Verbindung mit Pfeil 26">
+            <a:extLst>
+              <a:ext uri="{FF2B5EF4-FFF2-40B4-BE49-F238E27FC236}">
+                <a16:creationId xmlns:a16="http://schemas.microsoft.com/office/drawing/2014/main" id="{ED504CDE-5391-4E0A-B5B0-1BCFD16214B8}"/>
+              </a:ext>
+            </a:extLst>
+          </p:cNvPr>
+          <p:cNvCxnSpPr>
+            <a:cxnSpLocks/>
+            <a:stCxn id="10" idx="1"/>
+            <a:endCxn id="8" idx="3"/>
+          </p:cNvCxnSpPr>
+          <p:nvPr/>
+        </p:nvCxnSpPr>
+        <p:spPr>
+          <a:xfrm flipH="1" flipV="1">
+            <a:off x="3340100" y="4297031"/>
+            <a:ext cx="2209800" cy="1"/>
+          </a:xfrm>
+          <a:prstGeom prst="straightConnector1">
+            <a:avLst/>
+          </a:prstGeom>
+          <a:ln w="38100">
+            <a:tailEnd type="triangle"/>
+          </a:ln>
+        </p:spPr>
+        <p:style>
+          <a:lnRef idx="1">
+            <a:schemeClr val="accent1"/>
+          </a:lnRef>
+          <a:fillRef idx="0">
+            <a:schemeClr val="accent1"/>
+          </a:fillRef>
+          <a:effectRef idx="0">
+            <a:schemeClr val="accent1"/>
+          </a:effectRef>
+          <a:fontRef idx="minor">
+            <a:schemeClr val="tx1"/>
+          </a:fontRef>
+        </p:style>
+      </p:cxnSp>
+      <p:cxnSp>
+        <p:nvCxnSpPr>
+          <p:cNvPr id="31" name="Gerade Verbindung mit Pfeil 30">
+            <a:extLst>
+              <a:ext uri="{FF2B5EF4-FFF2-40B4-BE49-F238E27FC236}">
+                <a16:creationId xmlns:a16="http://schemas.microsoft.com/office/drawing/2014/main" id="{E442ACC6-3FF8-473B-B486-047FB3C559E4}"/>
+              </a:ext>
+            </a:extLst>
+          </p:cNvPr>
+          <p:cNvCxnSpPr>
+            <a:cxnSpLocks/>
+            <a:stCxn id="8" idx="2"/>
+          </p:cNvCxnSpPr>
+          <p:nvPr/>
+        </p:nvCxnSpPr>
+        <p:spPr>
+          <a:xfrm>
+            <a:off x="2882900" y="4737342"/>
+            <a:ext cx="0" cy="731209"/>
+          </a:xfrm>
+          <a:prstGeom prst="straightConnector1">
+            <a:avLst/>
+          </a:prstGeom>
+          <a:ln w="38100">
+            <a:tailEnd type="triangle"/>
+          </a:ln>
+        </p:spPr>
+        <p:style>
+          <a:lnRef idx="1">
+            <a:schemeClr val="accent1"/>
+          </a:lnRef>
+          <a:fillRef idx="0">
+            <a:schemeClr val="accent1"/>
+          </a:fillRef>
+          <a:effectRef idx="0">
+            <a:schemeClr val="accent1"/>
+          </a:effectRef>
+          <a:fontRef idx="minor">
+            <a:schemeClr val="tx1"/>
+          </a:fontRef>
+        </p:style>
+      </p:cxnSp>
+      <p:sp>
+        <p:nvSpPr>
+          <p:cNvPr id="35" name="Flussdiagramm: Verbinder 34">
+            <a:extLst>
+              <a:ext uri="{FF2B5EF4-FFF2-40B4-BE49-F238E27FC236}">
+                <a16:creationId xmlns:a16="http://schemas.microsoft.com/office/drawing/2014/main" id="{ABBC2490-9A9D-4188-AE86-66365A381768}"/>
+              </a:ext>
+            </a:extLst>
+          </p:cNvPr>
+          <p:cNvSpPr/>
+          <p:nvPr/>
+        </p:nvSpPr>
+        <p:spPr>
+          <a:xfrm>
+            <a:off x="2620962" y="5493227"/>
+            <a:ext cx="523875" cy="487752"/>
+          </a:xfrm>
+          <a:prstGeom prst="flowChartConnector">
+            <a:avLst/>
+          </a:prstGeom>
+          <a:ln w="57150">
+            <a:solidFill>
+              <a:schemeClr val="accent1">
+                <a:lumMod val="40000"/>
+                <a:lumOff val="60000"/>
+              </a:schemeClr>
+            </a:solidFill>
+          </a:ln>
+        </p:spPr>
+        <p:style>
+          <a:lnRef idx="2">
+            <a:schemeClr val="accent1">
+              <a:shade val="50000"/>
+            </a:schemeClr>
+          </a:lnRef>
+          <a:fillRef idx="1">
+            <a:schemeClr val="accent1"/>
+          </a:fillRef>
+          <a:effectRef idx="0">
+            <a:schemeClr val="accent1"/>
+          </a:effectRef>
+          <a:fontRef idx="minor">
+            <a:schemeClr val="lt1"/>
+          </a:fontRef>
+        </p:style>
+        <p:txBody>
+          <a:bodyPr rtlCol="0" anchor="ctr"/>
+          <a:lstStyle/>
+          <a:p>
+            <a:pPr algn="ctr"/>
+            <a:endParaRPr lang="de-DE" dirty="0"/>
+          </a:p>
+        </p:txBody>
+      </p:sp>
+      <p:cxnSp>
+        <p:nvCxnSpPr>
+          <p:cNvPr id="17411" name="Gerade Verbindung mit Pfeil 17410">
+            <a:extLst>
+              <a:ext uri="{FF2B5EF4-FFF2-40B4-BE49-F238E27FC236}">
+                <a16:creationId xmlns:a16="http://schemas.microsoft.com/office/drawing/2014/main" id="{F7250C69-1E1E-40A9-8826-F4CD7F8AC449}"/>
+              </a:ext>
+            </a:extLst>
+          </p:cNvPr>
+          <p:cNvCxnSpPr>
+            <a:cxnSpLocks/>
+            <a:stCxn id="8" idx="0"/>
+            <a:endCxn id="9" idx="2"/>
+          </p:cNvCxnSpPr>
+          <p:nvPr/>
+        </p:nvCxnSpPr>
+        <p:spPr>
+          <a:xfrm flipV="1">
+            <a:off x="2882900" y="2517897"/>
+            <a:ext cx="0" cy="1338823"/>
+          </a:xfrm>
+          <a:prstGeom prst="straightConnector1">
+            <a:avLst/>
+          </a:prstGeom>
+          <a:ln w="38100">
+            <a:tailEnd type="triangle"/>
+          </a:ln>
+        </p:spPr>
+        <p:style>
+          <a:lnRef idx="1">
+            <a:schemeClr val="accent1"/>
+          </a:lnRef>
+          <a:fillRef idx="0">
+            <a:schemeClr val="accent1"/>
+          </a:fillRef>
+          <a:effectRef idx="0">
+            <a:schemeClr val="accent1"/>
+          </a:effectRef>
+          <a:fontRef idx="minor">
+            <a:schemeClr val="tx1"/>
+          </a:fontRef>
+        </p:style>
+      </p:cxnSp>
+      <p:sp>
+        <p:nvSpPr>
+          <p:cNvPr id="17415" name="Textfeld 17414">
+            <a:extLst>
+              <a:ext uri="{FF2B5EF4-FFF2-40B4-BE49-F238E27FC236}">
+                <a16:creationId xmlns:a16="http://schemas.microsoft.com/office/drawing/2014/main" id="{84E5C001-F8AA-443B-BE3A-CD9EB52D2C52}"/>
+              </a:ext>
+            </a:extLst>
+          </p:cNvPr>
+          <p:cNvSpPr txBox="1"/>
+          <p:nvPr/>
+        </p:nvSpPr>
+        <p:spPr>
+          <a:xfrm>
+            <a:off x="2882899" y="4892115"/>
+            <a:ext cx="2813591" cy="369332"/>
+          </a:xfrm>
+          <a:prstGeom prst="rect">
+            <a:avLst/>
+          </a:prstGeom>
+          <a:noFill/>
+        </p:spPr>
+        <p:txBody>
+          <a:bodyPr wrap="none" rtlCol="0">
+            <a:spAutoFit/>
+          </a:bodyPr>
+          <a:lstStyle/>
+          <a:p>
+            <a:r>
+              <a:rPr lang="de-DE" dirty="0"/>
+              <a:t>[Abweichung klein genug]</a:t>
+            </a:r>
+          </a:p>
+        </p:txBody>
+      </p:sp>
+      <p:sp>
+        <p:nvSpPr>
+          <p:cNvPr id="17416" name="Textfeld 17415">
+            <a:extLst>
+              <a:ext uri="{FF2B5EF4-FFF2-40B4-BE49-F238E27FC236}">
+                <a16:creationId xmlns:a16="http://schemas.microsoft.com/office/drawing/2014/main" id="{7DDD7CB3-0BE9-4867-B223-E0C71E3CB166}"/>
+              </a:ext>
+            </a:extLst>
+          </p:cNvPr>
+          <p:cNvSpPr txBox="1"/>
+          <p:nvPr/>
+        </p:nvSpPr>
+        <p:spPr>
+          <a:xfrm>
+            <a:off x="2882899" y="3133044"/>
+            <a:ext cx="2416046" cy="369332"/>
+          </a:xfrm>
+          <a:prstGeom prst="rect">
+            <a:avLst/>
+          </a:prstGeom>
+          <a:noFill/>
+        </p:spPr>
+        <p:txBody>
+          <a:bodyPr wrap="none" rtlCol="0">
+            <a:spAutoFit/>
+          </a:bodyPr>
+          <a:lstStyle/>
+          <a:p>
+            <a:r>
+              <a:rPr lang="de-DE" dirty="0"/>
+              <a:t>[Abweichung zu groß]</a:t>
+            </a:r>
+          </a:p>
+        </p:txBody>
+      </p:sp>
+    </p:spTree>
+    <p:extLst>
+      <p:ext uri="{BB962C8B-B14F-4D97-AF65-F5344CB8AC3E}">
+        <p14:creationId xmlns:p14="http://schemas.microsoft.com/office/powerpoint/2010/main" val="3200748184"/>
+      </p:ext>
+    </p:extLst>
+  </p:cSld>
+  <p:clrMapOvr>
+    <a:masterClrMapping/>
+  </p:clrMapOvr>
+</p:sld>
+</file>
+
+<file path=ppt/slides/slide3.xml><?xml version="1.0" encoding="utf-8"?>
+<p:sld xmlns:a="http://schemas.openxmlformats.org/drawingml/2006/main" xmlns:r="http://schemas.openxmlformats.org/officeDocument/2006/relationships" xmlns:p="http://schemas.openxmlformats.org/presentationml/2006/main">
+  <p:cSld>
+    <p:spTree>
+      <p:nvGrpSpPr>
+        <p:cNvPr id="1" name=""/>
+        <p:cNvGrpSpPr/>
+        <p:nvPr/>
+      </p:nvGrpSpPr>
+      <p:grpSpPr>
+        <a:xfrm>
+          <a:off x="0" y="0"/>
+          <a:ext cx="0" cy="0"/>
+          <a:chOff x="0" y="0"/>
+          <a:chExt cx="0" cy="0"/>
+        </a:xfrm>
+      </p:grpSpPr>
+      <p:sp>
+        <p:nvSpPr>
+          <p:cNvPr id="17409" name="Titel 1"/>
+          <p:cNvSpPr>
+            <a:spLocks noGrp="1"/>
+          </p:cNvSpPr>
+          <p:nvPr>
+            <p:ph type="title"/>
+          </p:nvPr>
+        </p:nvSpPr>
+        <p:spPr/>
+        <p:txBody>
+          <a:bodyPr/>
+          <a:lstStyle/>
+          <a:p>
+            <a:r>
+              <a:rPr lang="de-DE" noProof="0" dirty="0"/>
+              <a:t>Vision</a:t>
+            </a:r>
+          </a:p>
+        </p:txBody>
+      </p:sp>
+      <p:sp>
+        <p:nvSpPr>
+          <p:cNvPr id="17412" name="Fußzeilenplatzhalter 3"/>
+          <p:cNvSpPr>
+            <a:spLocks noGrp="1"/>
+          </p:cNvSpPr>
+          <p:nvPr>
+            <p:ph type="ftr" sz="quarter" idx="10"/>
+          </p:nvPr>
+        </p:nvSpPr>
+        <p:spPr>
+          <a:noFill/>
+        </p:spPr>
+        <p:txBody>
+          <a:bodyPr/>
+          <a:lstStyle/>
+          <a:p>
+            <a:r>
+              <a:rPr lang="de-DE" dirty="0">
+                <a:latin typeface="Arial" charset="0"/>
+                <a:cs typeface="Arial" charset="0"/>
+              </a:rPr>
+              <a:t>Firnkes Patrick:</a:t>
+            </a:r>
+            <a:r>
+              <a:rPr lang="de-DE" dirty="0"/>
+              <a:t> Modellierung und Simulation von Lastverteilungsstrategien </a:t>
+            </a:r>
+            <a:endParaRPr lang="de-DE" dirty="0">
+              <a:latin typeface="Arial" charset="0"/>
+              <a:cs typeface="Arial" charset="0"/>
+            </a:endParaRPr>
+          </a:p>
+        </p:txBody>
+      </p:sp>
+      <p:sp>
+        <p:nvSpPr>
+          <p:cNvPr id="8" name="Inhaltsplatzhalter 7"/>
+          <p:cNvSpPr>
+            <a:spLocks noGrp="1"/>
+          </p:cNvSpPr>
+          <p:nvPr>
+            <p:ph idx="1"/>
+          </p:nvPr>
+        </p:nvSpPr>
+        <p:spPr>
+          <a:xfrm>
+            <a:off x="390525" y="1600200"/>
+            <a:ext cx="8363231" cy="4204258"/>
+          </a:xfrm>
+        </p:spPr>
+        <p:txBody>
+          <a:bodyPr/>
+          <a:lstStyle/>
+          <a:p>
+            <a:r>
+              <a:rPr lang="de-DE" dirty="0"/>
+              <a:t>Erstelle Simulation für das WLCG</a:t>
+            </a:r>
+          </a:p>
+        </p:txBody>
+      </p:sp>
+      <p:pic>
+        <p:nvPicPr>
+          <p:cNvPr id="5" name="Inhaltsplatzhalter 4">
+            <a:extLst>
+              <a:ext uri="{FF2B5EF4-FFF2-40B4-BE49-F238E27FC236}">
+                <a16:creationId xmlns:a16="http://schemas.microsoft.com/office/drawing/2014/main" id="{392515CF-A136-4751-A15B-95CCFB67AB8E}"/>
+              </a:ext>
+            </a:extLst>
+          </p:cNvPr>
+          <p:cNvPicPr>
+            <a:picLocks noChangeAspect="1"/>
+          </p:cNvPicPr>
+          <p:nvPr/>
+        </p:nvPicPr>
+        <p:blipFill>
+          <a:blip r:embed="rId3" cstate="print">
+            <a:extLst>
+              <a:ext uri="{28A0092B-C50C-407E-A947-70E740481C1C}">
+                <a14:useLocalDpi xmlns:a14="http://schemas.microsoft.com/office/drawing/2010/main" val="0"/>
+              </a:ext>
+            </a:extLst>
+          </a:blip>
+          <a:stretch>
+            <a:fillRect/>
+          </a:stretch>
+        </p:blipFill>
+        <p:spPr bwMode="auto">
+          <a:xfrm>
+            <a:off x="7302500" y="1001853"/>
+            <a:ext cx="1592908" cy="1295400"/>
+          </a:xfrm>
+          <a:prstGeom prst="rect">
+            <a:avLst/>
+          </a:prstGeom>
+          <a:noFill/>
+          <a:ln w="9525">
+            <a:noFill/>
+            <a:miter lim="800000"/>
+            <a:headEnd/>
+            <a:tailEnd/>
+          </a:ln>
+          <a:extLst>
+            <a:ext uri="{909E8E84-426E-40DD-AFC4-6F175D3DCCD1}">
+              <a14:hiddenFill xmlns:a14="http://schemas.microsoft.com/office/drawing/2010/main">
+                <a:solidFill>
+                  <a:srgbClr val="FFFFFF"/>
+                </a:solidFill>
+              </a14:hiddenFill>
+            </a:ext>
+          </a:extLst>
+        </p:spPr>
+      </p:pic>
+    </p:spTree>
+    <p:extLst>
+      <p:ext uri="{BB962C8B-B14F-4D97-AF65-F5344CB8AC3E}">
+        <p14:creationId xmlns:p14="http://schemas.microsoft.com/office/powerpoint/2010/main" val="536835335"/>
+      </p:ext>
+    </p:extLst>
+  </p:cSld>
+  <p:clrMapOvr>
+    <a:masterClrMapping/>
+  </p:clrMapOvr>
+</p:sld>
+</file>
+
 <file path=ppt/slides/slide4.xml><?xml version="1.0" encoding="utf-8"?>
 <p:sld xmlns:a="http://schemas.openxmlformats.org/drawingml/2006/main" xmlns:r="http://schemas.openxmlformats.org/officeDocument/2006/relationships" xmlns:p="http://schemas.openxmlformats.org/presentationml/2006/main">
   <p:cSld>
@@ -8395,15 +9753,80 @@
           <a:p>
             <a:r>
               <a:rPr lang="de-DE" dirty="0"/>
-              <a:t>Erstelle Simulation des gesamten WLCG</a:t>
-            </a:r>
-          </a:p>
-        </p:txBody>
-      </p:sp>
+              <a:t>Erstelle Simulation für das WLCG</a:t>
+            </a:r>
+          </a:p>
+          <a:p>
+            <a:r>
+              <a:rPr lang="de-DE" dirty="0"/>
+              <a:t>Nutze diese für:</a:t>
+            </a:r>
+          </a:p>
+          <a:p>
+            <a:pPr lvl="1"/>
+            <a:r>
+              <a:rPr lang="de-DE" dirty="0"/>
+              <a:t>Finde beste Lastverteilungsstrategie</a:t>
+            </a:r>
+          </a:p>
+        </p:txBody>
+      </p:sp>
+      <p:pic>
+        <p:nvPicPr>
+          <p:cNvPr id="9" name="Inhaltsplatzhalter 4">
+            <a:extLst>
+              <a:ext uri="{FF2B5EF4-FFF2-40B4-BE49-F238E27FC236}">
+                <a16:creationId xmlns:a16="http://schemas.microsoft.com/office/drawing/2014/main" id="{4DD49916-7397-4C15-BA32-2533E3A7BF06}"/>
+              </a:ext>
+            </a:extLst>
+          </p:cNvPr>
+          <p:cNvPicPr>
+            <a:picLocks noChangeAspect="1"/>
+          </p:cNvPicPr>
+          <p:nvPr/>
+        </p:nvPicPr>
+        <p:blipFill>
+          <a:blip r:embed="rId3" cstate="print">
+            <a:extLst>
+              <a:ext uri="{28A0092B-C50C-407E-A947-70E740481C1C}">
+                <a14:useLocalDpi xmlns:a14="http://schemas.microsoft.com/office/drawing/2010/main" val="0"/>
+              </a:ext>
+            </a:extLst>
+          </a:blip>
+          <a:stretch>
+            <a:fillRect/>
+          </a:stretch>
+        </p:blipFill>
+        <p:spPr bwMode="auto">
+          <a:xfrm>
+            <a:off x="7302500" y="1001853"/>
+            <a:ext cx="1592908" cy="1295400"/>
+          </a:xfrm>
+          <a:prstGeom prst="rect">
+            <a:avLst/>
+          </a:prstGeom>
+          <a:noFill/>
+          <a:ln w="9525">
+            <a:noFill/>
+            <a:miter lim="800000"/>
+            <a:headEnd/>
+            <a:tailEnd/>
+          </a:ln>
+          <a:extLst>
+            <a:ext uri="{909E8E84-426E-40DD-AFC4-6F175D3DCCD1}">
+              <a14:hiddenFill xmlns:a14="http://schemas.microsoft.com/office/drawing/2010/main">
+                <a:solidFill>
+                  <a:srgbClr val="FFFFFF"/>
+                </a:solidFill>
+              </a14:hiddenFill>
+            </a:ext>
+          </a:extLst>
+        </p:spPr>
+      </p:pic>
     </p:spTree>
     <p:extLst>
       <p:ext uri="{BB962C8B-B14F-4D97-AF65-F5344CB8AC3E}">
-        <p14:creationId xmlns:p14="http://schemas.microsoft.com/office/powerpoint/2010/main" val="536835335"/>
+        <p14:creationId xmlns:p14="http://schemas.microsoft.com/office/powerpoint/2010/main" val="761024283"/>
       </p:ext>
     </p:extLst>
   </p:cSld>
@@ -8509,7 +9932,7 @@
           <a:p>
             <a:r>
               <a:rPr lang="de-DE" dirty="0"/>
-              <a:t>Erstelle Simulation des gesamten WLCG</a:t>
+              <a:t>Erstelle Simulation für das WLCG</a:t>
             </a:r>
           </a:p>
           <a:p>
@@ -8525,12 +9948,71 @@
               <a:t>Finde beste Lastverteilungsstrategie</a:t>
             </a:r>
           </a:p>
-        </p:txBody>
-      </p:sp>
+          <a:p>
+            <a:pPr lvl="1"/>
+            <a:r>
+              <a:rPr lang="de-DE" noProof="0" dirty="0"/>
+              <a:t>Finde beste Verbesserung der Grid-Infrastruktur</a:t>
+            </a:r>
+          </a:p>
+        </p:txBody>
+      </p:sp>
+      <p:pic>
+        <p:nvPicPr>
+          <p:cNvPr id="5" name="Inhaltsplatzhalter 4">
+            <a:extLst>
+              <a:ext uri="{FF2B5EF4-FFF2-40B4-BE49-F238E27FC236}">
+                <a16:creationId xmlns:a16="http://schemas.microsoft.com/office/drawing/2014/main" id="{37132F0F-67C1-4764-8A0C-33D5AF0613AD}"/>
+              </a:ext>
+            </a:extLst>
+          </p:cNvPr>
+          <p:cNvPicPr>
+            <a:picLocks noChangeAspect="1"/>
+          </p:cNvPicPr>
+          <p:nvPr/>
+        </p:nvPicPr>
+        <p:blipFill>
+          <a:blip r:embed="rId3" cstate="print">
+            <a:extLst>
+              <a:ext uri="{28A0092B-C50C-407E-A947-70E740481C1C}">
+                <a14:useLocalDpi xmlns:a14="http://schemas.microsoft.com/office/drawing/2010/main" val="0"/>
+              </a:ext>
+            </a:extLst>
+          </a:blip>
+          <a:stretch>
+            <a:fillRect/>
+          </a:stretch>
+        </p:blipFill>
+        <p:spPr bwMode="auto">
+          <a:xfrm>
+            <a:off x="7302500" y="1001853"/>
+            <a:ext cx="1592908" cy="1295400"/>
+          </a:xfrm>
+          <a:prstGeom prst="rect">
+            <a:avLst/>
+          </a:prstGeom>
+          <a:noFill/>
+          <a:ln w="9525">
+            <a:noFill/>
+            <a:miter lim="800000"/>
+            <a:headEnd/>
+            <a:tailEnd/>
+          </a:ln>
+          <a:extLst>
+            <a:ext uri="{909E8E84-426E-40DD-AFC4-6F175D3DCCD1}">
+              <a14:hiddenFill xmlns:a14="http://schemas.microsoft.com/office/drawing/2010/main">
+                <a:solidFill>
+                  <a:srgbClr val="FFFFFF"/>
+                </a:solidFill>
+              </a14:hiddenFill>
+            </a:ext>
+          </a:extLst>
+        </p:spPr>
+      </p:pic>
     </p:spTree>
     <p:extLst>
       <p:ext uri="{BB962C8B-B14F-4D97-AF65-F5344CB8AC3E}">
-        <p14:creationId xmlns:p14="http://schemas.microsoft.com/office/powerpoint/2010/main" val="761024283"/>
+        <p14:creationId xmlns:p14="http://schemas.microsoft.com/office/powerpoint/2010/main" val="1683200005"/>
       </p:ext>
     </p:extLst>
   </p:cSld>
@@ -8636,7 +10118,7 @@
           <a:p>
             <a:r>
               <a:rPr lang="de-DE" dirty="0"/>
-              <a:t>Erstelle Simulation des gesamten WLCG</a:t>
+              <a:t>Erstelle Simulation für das WLCG</a:t>
             </a:r>
           </a:p>
           <a:p>
@@ -8656,15 +10138,74 @@
             <a:pPr lvl="1"/>
             <a:r>
               <a:rPr lang="de-DE" noProof="0" dirty="0"/>
-              <a:t>Finde beste Verbesserung der Grid Infrastruktur</a:t>
-            </a:r>
-          </a:p>
-        </p:txBody>
-      </p:sp>
+              <a:t>Finde beste Verbesserung der Grid-Infrastruktur</a:t>
+            </a:r>
+          </a:p>
+          <a:p>
+            <a:pPr lvl="1"/>
+            <a:r>
+              <a:rPr lang="de-DE" noProof="0" dirty="0"/>
+              <a:t>Finde beste Scheduling-Entscheidung</a:t>
+            </a:r>
+          </a:p>
+        </p:txBody>
+      </p:sp>
+      <p:pic>
+        <p:nvPicPr>
+          <p:cNvPr id="5" name="Inhaltsplatzhalter 4">
+            <a:extLst>
+              <a:ext uri="{FF2B5EF4-FFF2-40B4-BE49-F238E27FC236}">
+                <a16:creationId xmlns:a16="http://schemas.microsoft.com/office/drawing/2014/main" id="{942D3D74-D38F-4B02-B25E-3767B80918FB}"/>
+              </a:ext>
+            </a:extLst>
+          </p:cNvPr>
+          <p:cNvPicPr>
+            <a:picLocks noChangeAspect="1"/>
+          </p:cNvPicPr>
+          <p:nvPr/>
+        </p:nvPicPr>
+        <p:blipFill>
+          <a:blip r:embed="rId3" cstate="print">
+            <a:extLst>
+              <a:ext uri="{28A0092B-C50C-407E-A947-70E740481C1C}">
+                <a14:useLocalDpi xmlns:a14="http://schemas.microsoft.com/office/drawing/2010/main" val="0"/>
+              </a:ext>
+            </a:extLst>
+          </a:blip>
+          <a:stretch>
+            <a:fillRect/>
+          </a:stretch>
+        </p:blipFill>
+        <p:spPr bwMode="auto">
+          <a:xfrm>
+            <a:off x="7302500" y="1001853"/>
+            <a:ext cx="1592908" cy="1295400"/>
+          </a:xfrm>
+          <a:prstGeom prst="rect">
+            <a:avLst/>
+          </a:prstGeom>
+          <a:noFill/>
+          <a:ln w="9525">
+            <a:noFill/>
+            <a:miter lim="800000"/>
+            <a:headEnd/>
+            <a:tailEnd/>
+          </a:ln>
+          <a:extLst>
+            <a:ext uri="{909E8E84-426E-40DD-AFC4-6F175D3DCCD1}">
+              <a14:hiddenFill xmlns:a14="http://schemas.microsoft.com/office/drawing/2010/main">
+                <a:solidFill>
+                  <a:srgbClr val="FFFFFF"/>
+                </a:solidFill>
+              </a14:hiddenFill>
+            </a:ext>
+          </a:extLst>
+        </p:spPr>
+      </p:pic>
     </p:spTree>
     <p:extLst>
       <p:ext uri="{BB962C8B-B14F-4D97-AF65-F5344CB8AC3E}">
-        <p14:creationId xmlns:p14="http://schemas.microsoft.com/office/powerpoint/2010/main" val="1683200005"/>
+        <p14:creationId xmlns:p14="http://schemas.microsoft.com/office/powerpoint/2010/main" val="4263219587"/>
       </p:ext>
     </p:extLst>
   </p:cSld>
@@ -8770,7 +10311,7 @@
           <a:p>
             <a:r>
               <a:rPr lang="de-DE" dirty="0"/>
-              <a:t>Erstelle Simulation des gesamten WLCG</a:t>
+              <a:t>Erstelle Simulation für das WLCG</a:t>
             </a:r>
           </a:p>
           <a:p>
@@ -8790,22 +10331,86 @@
             <a:pPr lvl="1"/>
             <a:r>
               <a:rPr lang="de-DE" noProof="0" dirty="0"/>
-              <a:t>Finde beste Verbesserung der Grid Infrastruktur</a:t>
+              <a:t>Finde beste Verbesserung der Grid-Infrastruktur</a:t>
             </a:r>
           </a:p>
           <a:p>
             <a:pPr lvl="1"/>
             <a:r>
               <a:rPr lang="de-DE" noProof="0" dirty="0"/>
-              <a:t>Finde beste Scheduling Entscheidung</a:t>
-            </a:r>
-          </a:p>
-        </p:txBody>
-      </p:sp>
+              <a:t>Finde beste Scheduling-Entscheidung</a:t>
+            </a:r>
+          </a:p>
+          <a:p>
+            <a:r>
+              <a:rPr lang="de-DE" noProof="0" dirty="0"/>
+              <a:t>Optimiere Ressource-Nutzung des Grids</a:t>
+            </a:r>
+          </a:p>
+          <a:p>
+            <a:pPr marL="394575" lvl="1" indent="0">
+              <a:buNone/>
+            </a:pPr>
+            <a:endParaRPr lang="de-DE" noProof="0" dirty="0"/>
+          </a:p>
+        </p:txBody>
+      </p:sp>
+      <p:pic>
+        <p:nvPicPr>
+          <p:cNvPr id="5" name="Inhaltsplatzhalter 4">
+            <a:extLst>
+              <a:ext uri="{FF2B5EF4-FFF2-40B4-BE49-F238E27FC236}">
+                <a16:creationId xmlns:a16="http://schemas.microsoft.com/office/drawing/2014/main" id="{42ECFF88-CBBD-42C2-B462-90C640DC5863}"/>
+              </a:ext>
+            </a:extLst>
+          </p:cNvPr>
+          <p:cNvPicPr>
+            <a:picLocks noChangeAspect="1"/>
+          </p:cNvPicPr>
+          <p:nvPr/>
+        </p:nvPicPr>
+        <p:blipFill>
+          <a:blip r:embed="rId3" cstate="print">
+            <a:extLst>
+              <a:ext uri="{28A0092B-C50C-407E-A947-70E740481C1C}">
+                <a14:useLocalDpi xmlns:a14="http://schemas.microsoft.com/office/drawing/2010/main" val="0"/>
+              </a:ext>
+            </a:extLst>
+          </a:blip>
+          <a:stretch>
+            <a:fillRect/>
+          </a:stretch>
+        </p:blipFill>
+        <p:spPr bwMode="auto">
+          <a:xfrm>
+            <a:off x="7302500" y="1001853"/>
+            <a:ext cx="1592908" cy="1295400"/>
+          </a:xfrm>
+          <a:prstGeom prst="rect">
+            <a:avLst/>
+          </a:prstGeom>
+          <a:noFill/>
+          <a:ln w="9525">
+            <a:noFill/>
+            <a:miter lim="800000"/>
+            <a:headEnd/>
+            <a:tailEnd/>
+          </a:ln>
+          <a:extLst>
+            <a:ext uri="{909E8E84-426E-40DD-AFC4-6F175D3DCCD1}">
+              <a14:hiddenFill xmlns:a14="http://schemas.microsoft.com/office/drawing/2010/main">
+                <a:solidFill>
+                  <a:srgbClr val="FFFFFF"/>
+                </a:solidFill>
+              </a14:hiddenFill>
+            </a:ext>
+          </a:extLst>
+        </p:spPr>
+      </p:pic>
     </p:spTree>
     <p:extLst>
       <p:ext uri="{BB962C8B-B14F-4D97-AF65-F5344CB8AC3E}">
-        <p14:creationId xmlns:p14="http://schemas.microsoft.com/office/powerpoint/2010/main" val="4263219587"/>
+        <p14:creationId xmlns:p14="http://schemas.microsoft.com/office/powerpoint/2010/main" val="997665982"/>
       </p:ext>
     </p:extLst>
   </p:cSld>
@@ -8849,7 +10454,7 @@
           <a:p>
             <a:r>
               <a:rPr lang="de-DE" noProof="0" dirty="0"/>
-              <a:t>Vision</a:t>
+              <a:t>Projekt</a:t>
             </a:r>
           </a:p>
         </p:txBody>
@@ -8901,8 +10506,8 @@
         </p:nvSpPr>
         <p:spPr>
           <a:xfrm>
-            <a:off x="390525" y="1600200"/>
-            <a:ext cx="8363231" cy="4204258"/>
+            <a:off x="390525" y="1828800"/>
+            <a:ext cx="8363231" cy="3975658"/>
           </a:xfrm>
         </p:spPr>
         <p:txBody>
@@ -8910,55 +10515,83 @@
           <a:lstStyle/>
           <a:p>
             <a:r>
+              <a:rPr lang="de-DE" noProof="0" dirty="0"/>
+              <a:t>Modelliere und Simuliere </a:t>
+            </a:r>
+            <a:r>
+              <a:rPr lang="de-DE" noProof="0" dirty="0" err="1"/>
+              <a:t>GridKa</a:t>
+            </a:r>
+            <a:endParaRPr lang="de-DE" noProof="0" dirty="0"/>
+          </a:p>
+          <a:p>
+            <a:r>
               <a:rPr lang="de-DE" dirty="0"/>
-              <a:t>Erstelle Simulation des gesamten WLCG</a:t>
-            </a:r>
-          </a:p>
-          <a:p>
+              <a:t>Ergebnis</a:t>
+            </a:r>
+            <a:endParaRPr lang="de-DE" noProof="0" dirty="0"/>
+          </a:p>
+          <a:p>
+            <a:pPr lvl="1"/>
             <a:r>
               <a:rPr lang="de-DE" dirty="0"/>
-              <a:t>Nutze diese für:</a:t>
-            </a:r>
+              <a:t>Modell des </a:t>
+            </a:r>
+            <a:r>
+              <a:rPr lang="de-DE" dirty="0" err="1"/>
+              <a:t>GridKa</a:t>
+            </a:r>
+            <a:endParaRPr lang="de-DE" dirty="0"/>
           </a:p>
           <a:p>
             <a:pPr lvl="1"/>
             <a:r>
               <a:rPr lang="de-DE" dirty="0"/>
-              <a:t>Finde beste Lastverteilungsstrategie</a:t>
-            </a:r>
-          </a:p>
-          <a:p>
-            <a:pPr lvl="1"/>
-            <a:r>
-              <a:rPr lang="de-DE" noProof="0" dirty="0"/>
-              <a:t>Finde beste Verbesserung der Grid Infrastruktur</a:t>
-            </a:r>
-          </a:p>
-          <a:p>
-            <a:pPr lvl="1"/>
-            <a:r>
-              <a:rPr lang="de-DE" noProof="0" dirty="0"/>
-              <a:t>Finde beste Scheduling Entscheidung</a:t>
-            </a:r>
-          </a:p>
-          <a:p>
-            <a:r>
-              <a:rPr lang="de-DE" noProof="0" dirty="0"/>
-              <a:t>Optimiere Ressource Nutzung des Grids</a:t>
-            </a:r>
+              <a:t>Finde geeigneten Simulator für Simulation des </a:t>
+            </a:r>
+            <a:r>
+              <a:rPr lang="de-DE" dirty="0" err="1"/>
+              <a:t>GridKa</a:t>
+            </a:r>
+            <a:endParaRPr lang="de-DE" dirty="0"/>
           </a:p>
           <a:p>
             <a:pPr marL="394575" lvl="1" indent="0">
               <a:buNone/>
             </a:pPr>
+            <a:endParaRPr lang="de-DE" dirty="0"/>
+          </a:p>
+          <a:p>
+            <a:pPr marL="0" indent="0">
+              <a:buNone/>
+            </a:pPr>
+            <a:endParaRPr lang="de-DE" dirty="0"/>
+          </a:p>
+          <a:p>
+            <a:pPr marL="394575" lvl="1" indent="0">
+              <a:buNone/>
+            </a:pPr>
+            <a:r>
+              <a:rPr lang="de-DE" dirty="0"/>
+              <a:t> </a:t>
+            </a:r>
             <a:endParaRPr lang="de-DE" noProof="0" dirty="0"/>
+          </a:p>
+          <a:p>
+            <a:pPr marL="394575" lvl="1" indent="0">
+              <a:buNone/>
+            </a:pPr>
+            <a:r>
+              <a:rPr lang="de-DE" noProof="0" dirty="0"/>
+              <a:t>	</a:t>
+            </a:r>
           </a:p>
         </p:txBody>
       </p:sp>
     </p:spTree>
     <p:extLst>
       <p:ext uri="{BB962C8B-B14F-4D97-AF65-F5344CB8AC3E}">
-        <p14:creationId xmlns:p14="http://schemas.microsoft.com/office/powerpoint/2010/main" val="997665982"/>
+        <p14:creationId xmlns:p14="http://schemas.microsoft.com/office/powerpoint/2010/main" val="2669719383"/>
       </p:ext>
     </p:extLst>
   </p:cSld>
@@ -9001,9 +10634,10 @@
           <a:lstStyle/>
           <a:p>
             <a:r>
-              <a:rPr lang="de-DE" noProof="0" dirty="0"/>
-              <a:t>Projekt</a:t>
-            </a:r>
+              <a:rPr lang="de-DE" dirty="0"/>
+              <a:t>Planung – erste 4 Wochen</a:t>
+            </a:r>
+            <a:endParaRPr lang="de-DE" noProof="0" dirty="0"/>
           </a:p>
         </p:txBody>
       </p:sp>
@@ -9054,56 +10688,13 @@
         </p:nvSpPr>
         <p:spPr>
           <a:xfrm>
-            <a:off x="390525" y="1828800"/>
-            <a:ext cx="8363231" cy="3975658"/>
+            <a:off x="390525" y="1600200"/>
+            <a:ext cx="8363231" cy="4204258"/>
           </a:xfrm>
         </p:spPr>
         <p:txBody>
           <a:bodyPr/>
           <a:lstStyle/>
-          <a:p>
-            <a:r>
-              <a:rPr lang="de-DE" noProof="0" dirty="0"/>
-              <a:t>Modelliere und Simuliere </a:t>
-            </a:r>
-            <a:r>
-              <a:rPr lang="de-DE" noProof="0" dirty="0" err="1"/>
-              <a:t>GridKa</a:t>
-            </a:r>
-            <a:endParaRPr lang="de-DE" noProof="0" dirty="0"/>
-          </a:p>
-          <a:p>
-            <a:r>
-              <a:rPr lang="de-DE" dirty="0"/>
-              <a:t>Ergebnis</a:t>
-            </a:r>
-            <a:endParaRPr lang="de-DE" noProof="0" dirty="0"/>
-          </a:p>
-          <a:p>
-            <a:pPr lvl="1"/>
-            <a:r>
-              <a:rPr lang="de-DE" dirty="0"/>
-              <a:t>Modell des </a:t>
-            </a:r>
-            <a:r>
-              <a:rPr lang="de-DE" dirty="0" err="1"/>
-              <a:t>GridKa</a:t>
-            </a:r>
-            <a:endParaRPr lang="de-DE" dirty="0"/>
-          </a:p>
-          <a:p>
-            <a:pPr lvl="1"/>
-            <a:r>
-              <a:rPr lang="de-DE" dirty="0"/>
-              <a:t>Finde geeigneten Simulator für Simulation des WLCG</a:t>
-            </a:r>
-          </a:p>
-          <a:p>
-            <a:pPr marL="394575" lvl="1" indent="0">
-              <a:buNone/>
-            </a:pPr>
-            <a:endParaRPr lang="de-DE" dirty="0"/>
-          </a:p>
           <a:p>
             <a:pPr marL="0" indent="0">
               <a:buNone/>
@@ -9111,22 +10702,602 @@
             <a:endParaRPr lang="de-DE" dirty="0"/>
           </a:p>
           <a:p>
+            <a:pPr marL="0" indent="0">
+              <a:buNone/>
+            </a:pPr>
+            <a:endParaRPr lang="de-DE" noProof="0" dirty="0"/>
+          </a:p>
+          <a:p>
+            <a:pPr marL="0" indent="0">
+              <a:buNone/>
+            </a:pPr>
+            <a:endParaRPr lang="de-DE" noProof="0" dirty="0"/>
+          </a:p>
+          <a:p>
+            <a:pPr marL="0" indent="0">
+              <a:buNone/>
+            </a:pPr>
+            <a:endParaRPr lang="de-DE" noProof="0" dirty="0"/>
+          </a:p>
+          <a:p>
+            <a:pPr marL="0" indent="0">
+              <a:buNone/>
+            </a:pPr>
+            <a:endParaRPr lang="de-DE" noProof="0" dirty="0"/>
+          </a:p>
+          <a:p>
             <a:pPr marL="394575" lvl="1" indent="0">
               <a:buNone/>
             </a:pPr>
             <a:r>
-              <a:rPr lang="de-DE" dirty="0"/>
-              <a:t> </a:t>
-            </a:r>
-            <a:endParaRPr lang="de-DE" noProof="0" dirty="0"/>
-          </a:p>
-          <a:p>
-            <a:pPr marL="394575" lvl="1" indent="0">
-              <a:buNone/>
-            </a:pPr>
-            <a:r>
               <a:rPr lang="de-DE" noProof="0" dirty="0"/>
               <a:t>	</a:t>
+            </a:r>
+          </a:p>
+        </p:txBody>
+      </p:sp>
+      <p:sp>
+        <p:nvSpPr>
+          <p:cNvPr id="2" name="Rechteck: abgerundete Ecken 1">
+            <a:extLst>
+              <a:ext uri="{FF2B5EF4-FFF2-40B4-BE49-F238E27FC236}">
+                <a16:creationId xmlns:a16="http://schemas.microsoft.com/office/drawing/2014/main" id="{578473B9-7336-4B03-86BB-F2AF10BD5DB0}"/>
+              </a:ext>
+            </a:extLst>
+          </p:cNvPr>
+          <p:cNvSpPr/>
+          <p:nvPr/>
+        </p:nvSpPr>
+        <p:spPr>
+          <a:xfrm>
+            <a:off x="1287463" y="1536142"/>
+            <a:ext cx="1905000" cy="1066800"/>
+          </a:xfrm>
+          <a:prstGeom prst="roundRect">
+            <a:avLst/>
+          </a:prstGeom>
+        </p:spPr>
+        <p:style>
+          <a:lnRef idx="2">
+            <a:schemeClr val="accent1">
+              <a:shade val="50000"/>
+            </a:schemeClr>
+          </a:lnRef>
+          <a:fillRef idx="1">
+            <a:schemeClr val="accent1"/>
+          </a:fillRef>
+          <a:effectRef idx="0">
+            <a:schemeClr val="accent1"/>
+          </a:effectRef>
+          <a:fontRef idx="minor">
+            <a:schemeClr val="lt1"/>
+          </a:fontRef>
+        </p:style>
+        <p:txBody>
+          <a:bodyPr rtlCol="0" anchor="ctr"/>
+          <a:lstStyle/>
+          <a:p>
+            <a:pPr algn="ctr"/>
+            <a:r>
+              <a:rPr lang="de-DE" dirty="0"/>
+              <a:t>Erhalte initiale Daten</a:t>
+            </a:r>
+          </a:p>
+        </p:txBody>
+      </p:sp>
+      <p:sp>
+        <p:nvSpPr>
+          <p:cNvPr id="6" name="Rechteck: abgerundete Ecken 5">
+            <a:extLst>
+              <a:ext uri="{FF2B5EF4-FFF2-40B4-BE49-F238E27FC236}">
+                <a16:creationId xmlns:a16="http://schemas.microsoft.com/office/drawing/2014/main" id="{8C1CED9C-417F-4D2F-BCA8-F97776F75A83}"/>
+              </a:ext>
+            </a:extLst>
+          </p:cNvPr>
+          <p:cNvSpPr/>
+          <p:nvPr/>
+        </p:nvSpPr>
+        <p:spPr>
+          <a:xfrm>
+            <a:off x="4800600" y="1536142"/>
+            <a:ext cx="1905000" cy="1066800"/>
+          </a:xfrm>
+          <a:prstGeom prst="roundRect">
+            <a:avLst/>
+          </a:prstGeom>
+        </p:spPr>
+        <p:style>
+          <a:lnRef idx="2">
+            <a:schemeClr val="accent1">
+              <a:shade val="50000"/>
+            </a:schemeClr>
+          </a:lnRef>
+          <a:fillRef idx="1">
+            <a:schemeClr val="accent1"/>
+          </a:fillRef>
+          <a:effectRef idx="0">
+            <a:schemeClr val="accent1"/>
+          </a:effectRef>
+          <a:fontRef idx="minor">
+            <a:schemeClr val="lt1"/>
+          </a:fontRef>
+        </p:style>
+        <p:txBody>
+          <a:bodyPr rtlCol="0" anchor="ctr"/>
+          <a:lstStyle/>
+          <a:p>
+            <a:pPr algn="ctr"/>
+            <a:r>
+              <a:rPr lang="de-DE" dirty="0"/>
+              <a:t>Erstelle stark vereinfachtes Modell</a:t>
+            </a:r>
+          </a:p>
+        </p:txBody>
+      </p:sp>
+      <p:sp>
+        <p:nvSpPr>
+          <p:cNvPr id="7" name="Rechteck: abgerundete Ecken 6">
+            <a:extLst>
+              <a:ext uri="{FF2B5EF4-FFF2-40B4-BE49-F238E27FC236}">
+                <a16:creationId xmlns:a16="http://schemas.microsoft.com/office/drawing/2014/main" id="{4D786681-4ACC-4F62-BD3F-8888397B39A0}"/>
+              </a:ext>
+            </a:extLst>
+          </p:cNvPr>
+          <p:cNvSpPr/>
+          <p:nvPr/>
+        </p:nvSpPr>
+        <p:spPr>
+          <a:xfrm>
+            <a:off x="982663" y="3946989"/>
+            <a:ext cx="2514600" cy="1066800"/>
+          </a:xfrm>
+          <a:prstGeom prst="roundRect">
+            <a:avLst/>
+          </a:prstGeom>
+        </p:spPr>
+        <p:style>
+          <a:lnRef idx="2">
+            <a:schemeClr val="accent1">
+              <a:shade val="50000"/>
+            </a:schemeClr>
+          </a:lnRef>
+          <a:fillRef idx="1">
+            <a:schemeClr val="accent1"/>
+          </a:fillRef>
+          <a:effectRef idx="0">
+            <a:schemeClr val="accent1"/>
+          </a:effectRef>
+          <a:fontRef idx="minor">
+            <a:schemeClr val="lt1"/>
+          </a:fontRef>
+        </p:style>
+        <p:txBody>
+          <a:bodyPr rtlCol="0" anchor="ctr"/>
+          <a:lstStyle/>
+          <a:p>
+            <a:pPr algn="ctr"/>
+            <a:r>
+              <a:rPr lang="de-DE" dirty="0"/>
+              <a:t>Erzeuge Simulationsergebnis</a:t>
+            </a:r>
+          </a:p>
+        </p:txBody>
+      </p:sp>
+      <p:sp>
+        <p:nvSpPr>
+          <p:cNvPr id="5" name="Ellipse 4">
+            <a:extLst>
+              <a:ext uri="{FF2B5EF4-FFF2-40B4-BE49-F238E27FC236}">
+                <a16:creationId xmlns:a16="http://schemas.microsoft.com/office/drawing/2014/main" id="{25E0D2E8-C48E-4454-9C97-E0E302BF1EFA}"/>
+              </a:ext>
+            </a:extLst>
+          </p:cNvPr>
+          <p:cNvSpPr/>
+          <p:nvPr/>
+        </p:nvSpPr>
+        <p:spPr>
+          <a:xfrm>
+            <a:off x="198369" y="1868448"/>
+            <a:ext cx="384311" cy="402187"/>
+          </a:xfrm>
+          <a:prstGeom prst="ellipse">
+            <a:avLst/>
+          </a:prstGeom>
+          <a:ln w="25400"/>
+        </p:spPr>
+        <p:style>
+          <a:lnRef idx="2">
+            <a:schemeClr val="accent1">
+              <a:shade val="50000"/>
+            </a:schemeClr>
+          </a:lnRef>
+          <a:fillRef idx="1">
+            <a:schemeClr val="accent1"/>
+          </a:fillRef>
+          <a:effectRef idx="0">
+            <a:schemeClr val="accent1"/>
+          </a:effectRef>
+          <a:fontRef idx="minor">
+            <a:schemeClr val="lt1"/>
+          </a:fontRef>
+        </p:style>
+        <p:txBody>
+          <a:bodyPr rtlCol="0" anchor="ctr"/>
+          <a:lstStyle/>
+          <a:p>
+            <a:pPr algn="ctr"/>
+            <a:endParaRPr lang="de-DE"/>
+          </a:p>
+        </p:txBody>
+      </p:sp>
+      <p:sp>
+        <p:nvSpPr>
+          <p:cNvPr id="9" name="Raute 8">
+            <a:extLst>
+              <a:ext uri="{FF2B5EF4-FFF2-40B4-BE49-F238E27FC236}">
+                <a16:creationId xmlns:a16="http://schemas.microsoft.com/office/drawing/2014/main" id="{AC0BE4F4-F323-4263-963C-BA7FCDB12193}"/>
+              </a:ext>
+            </a:extLst>
+          </p:cNvPr>
+          <p:cNvSpPr/>
+          <p:nvPr/>
+        </p:nvSpPr>
+        <p:spPr>
+          <a:xfrm>
+            <a:off x="5264649" y="4061289"/>
+            <a:ext cx="914400" cy="838200"/>
+          </a:xfrm>
+          <a:prstGeom prst="diamond">
+            <a:avLst/>
+          </a:prstGeom>
+        </p:spPr>
+        <p:style>
+          <a:lnRef idx="2">
+            <a:schemeClr val="accent1">
+              <a:shade val="50000"/>
+            </a:schemeClr>
+          </a:lnRef>
+          <a:fillRef idx="1">
+            <a:schemeClr val="accent1"/>
+          </a:fillRef>
+          <a:effectRef idx="0">
+            <a:schemeClr val="accent1"/>
+          </a:effectRef>
+          <a:fontRef idx="minor">
+            <a:schemeClr val="lt1"/>
+          </a:fontRef>
+        </p:style>
+        <p:txBody>
+          <a:bodyPr rtlCol="0" anchor="ctr"/>
+          <a:lstStyle/>
+          <a:p>
+            <a:pPr algn="ctr"/>
+            <a:endParaRPr lang="de-DE"/>
+          </a:p>
+        </p:txBody>
+      </p:sp>
+      <p:cxnSp>
+        <p:nvCxnSpPr>
+          <p:cNvPr id="12" name="Gerade Verbindung mit Pfeil 11">
+            <a:extLst>
+              <a:ext uri="{FF2B5EF4-FFF2-40B4-BE49-F238E27FC236}">
+                <a16:creationId xmlns:a16="http://schemas.microsoft.com/office/drawing/2014/main" id="{52126832-A466-4496-9E29-FE46B6C80B38}"/>
+              </a:ext>
+            </a:extLst>
+          </p:cNvPr>
+          <p:cNvCxnSpPr>
+            <a:cxnSpLocks/>
+            <a:stCxn id="5" idx="6"/>
+            <a:endCxn id="2" idx="1"/>
+          </p:cNvCxnSpPr>
+          <p:nvPr/>
+        </p:nvCxnSpPr>
+        <p:spPr>
+          <a:xfrm>
+            <a:off x="582680" y="2069542"/>
+            <a:ext cx="704783" cy="0"/>
+          </a:xfrm>
+          <a:prstGeom prst="straightConnector1">
+            <a:avLst/>
+          </a:prstGeom>
+          <a:ln w="38100">
+            <a:tailEnd type="triangle"/>
+          </a:ln>
+        </p:spPr>
+        <p:style>
+          <a:lnRef idx="1">
+            <a:schemeClr val="accent1"/>
+          </a:lnRef>
+          <a:fillRef idx="0">
+            <a:schemeClr val="accent1"/>
+          </a:fillRef>
+          <a:effectRef idx="0">
+            <a:schemeClr val="accent1"/>
+          </a:effectRef>
+          <a:fontRef idx="minor">
+            <a:schemeClr val="tx1"/>
+          </a:fontRef>
+        </p:style>
+      </p:cxnSp>
+      <p:cxnSp>
+        <p:nvCxnSpPr>
+          <p:cNvPr id="15" name="Gerade Verbindung mit Pfeil 14">
+            <a:extLst>
+              <a:ext uri="{FF2B5EF4-FFF2-40B4-BE49-F238E27FC236}">
+                <a16:creationId xmlns:a16="http://schemas.microsoft.com/office/drawing/2014/main" id="{B0BB29C9-8526-40DF-83D5-8947BBFDAFDB}"/>
+              </a:ext>
+            </a:extLst>
+          </p:cNvPr>
+          <p:cNvCxnSpPr>
+            <a:cxnSpLocks/>
+            <a:stCxn id="2" idx="3"/>
+            <a:endCxn id="6" idx="1"/>
+          </p:cNvCxnSpPr>
+          <p:nvPr/>
+        </p:nvCxnSpPr>
+        <p:spPr>
+          <a:xfrm>
+            <a:off x="3192463" y="2069542"/>
+            <a:ext cx="1608137" cy="0"/>
+          </a:xfrm>
+          <a:prstGeom prst="straightConnector1">
+            <a:avLst/>
+          </a:prstGeom>
+          <a:ln w="38100">
+            <a:tailEnd type="triangle"/>
+          </a:ln>
+        </p:spPr>
+        <p:style>
+          <a:lnRef idx="1">
+            <a:schemeClr val="accent1"/>
+          </a:lnRef>
+          <a:fillRef idx="0">
+            <a:schemeClr val="accent1"/>
+          </a:fillRef>
+          <a:effectRef idx="0">
+            <a:schemeClr val="accent1"/>
+          </a:effectRef>
+          <a:fontRef idx="minor">
+            <a:schemeClr val="tx1"/>
+          </a:fontRef>
+        </p:style>
+      </p:cxnSp>
+      <p:cxnSp>
+        <p:nvCxnSpPr>
+          <p:cNvPr id="18" name="Gerade Verbindung mit Pfeil 17">
+            <a:extLst>
+              <a:ext uri="{FF2B5EF4-FFF2-40B4-BE49-F238E27FC236}">
+                <a16:creationId xmlns:a16="http://schemas.microsoft.com/office/drawing/2014/main" id="{578B0CB7-CF7D-495D-9DA6-6F9E4D01415F}"/>
+              </a:ext>
+            </a:extLst>
+          </p:cNvPr>
+          <p:cNvCxnSpPr>
+            <a:cxnSpLocks/>
+            <a:stCxn id="6" idx="2"/>
+            <a:endCxn id="7" idx="0"/>
+          </p:cNvCxnSpPr>
+          <p:nvPr/>
+        </p:nvCxnSpPr>
+        <p:spPr>
+          <a:xfrm flipH="1">
+            <a:off x="2239963" y="2602942"/>
+            <a:ext cx="3513137" cy="1344047"/>
+          </a:xfrm>
+          <a:prstGeom prst="straightConnector1">
+            <a:avLst/>
+          </a:prstGeom>
+          <a:ln w="38100">
+            <a:tailEnd type="triangle"/>
+          </a:ln>
+        </p:spPr>
+        <p:style>
+          <a:lnRef idx="1">
+            <a:schemeClr val="accent1"/>
+          </a:lnRef>
+          <a:fillRef idx="0">
+            <a:schemeClr val="accent1"/>
+          </a:fillRef>
+          <a:effectRef idx="0">
+            <a:schemeClr val="accent1"/>
+          </a:effectRef>
+          <a:fontRef idx="minor">
+            <a:schemeClr val="tx1"/>
+          </a:fontRef>
+        </p:style>
+      </p:cxnSp>
+      <p:cxnSp>
+        <p:nvCxnSpPr>
+          <p:cNvPr id="21" name="Gerade Verbindung mit Pfeil 20">
+            <a:extLst>
+              <a:ext uri="{FF2B5EF4-FFF2-40B4-BE49-F238E27FC236}">
+                <a16:creationId xmlns:a16="http://schemas.microsoft.com/office/drawing/2014/main" id="{0D3853CC-5CB2-47E8-A8F0-C6FE3698C626}"/>
+              </a:ext>
+            </a:extLst>
+          </p:cNvPr>
+          <p:cNvCxnSpPr>
+            <a:cxnSpLocks/>
+            <a:stCxn id="7" idx="3"/>
+            <a:endCxn id="9" idx="1"/>
+          </p:cNvCxnSpPr>
+          <p:nvPr/>
+        </p:nvCxnSpPr>
+        <p:spPr>
+          <a:xfrm>
+            <a:off x="3497263" y="4480389"/>
+            <a:ext cx="1767386" cy="0"/>
+          </a:xfrm>
+          <a:prstGeom prst="straightConnector1">
+            <a:avLst/>
+          </a:prstGeom>
+          <a:ln w="38100">
+            <a:tailEnd type="triangle"/>
+          </a:ln>
+        </p:spPr>
+        <p:style>
+          <a:lnRef idx="1">
+            <a:schemeClr val="accent1"/>
+          </a:lnRef>
+          <a:fillRef idx="0">
+            <a:schemeClr val="accent1"/>
+          </a:fillRef>
+          <a:effectRef idx="0">
+            <a:schemeClr val="accent1"/>
+          </a:effectRef>
+          <a:fontRef idx="minor">
+            <a:schemeClr val="tx1"/>
+          </a:fontRef>
+        </p:style>
+      </p:cxnSp>
+      <p:cxnSp>
+        <p:nvCxnSpPr>
+          <p:cNvPr id="27" name="Gerade Verbindung mit Pfeil 26">
+            <a:extLst>
+              <a:ext uri="{FF2B5EF4-FFF2-40B4-BE49-F238E27FC236}">
+                <a16:creationId xmlns:a16="http://schemas.microsoft.com/office/drawing/2014/main" id="{6A793FD2-E925-4EB3-9900-AAE6C5D9BDFE}"/>
+              </a:ext>
+            </a:extLst>
+          </p:cNvPr>
+          <p:cNvCxnSpPr>
+            <a:cxnSpLocks/>
+            <a:stCxn id="9" idx="3"/>
+          </p:cNvCxnSpPr>
+          <p:nvPr/>
+        </p:nvCxnSpPr>
+        <p:spPr>
+          <a:xfrm>
+            <a:off x="6179049" y="4480389"/>
+            <a:ext cx="1440951" cy="0"/>
+          </a:xfrm>
+          <a:prstGeom prst="straightConnector1">
+            <a:avLst/>
+          </a:prstGeom>
+          <a:ln w="38100">
+            <a:tailEnd type="triangle"/>
+          </a:ln>
+        </p:spPr>
+        <p:style>
+          <a:lnRef idx="1">
+            <a:schemeClr val="accent1"/>
+          </a:lnRef>
+          <a:fillRef idx="0">
+            <a:schemeClr val="accent1"/>
+          </a:fillRef>
+          <a:effectRef idx="0">
+            <a:schemeClr val="accent1"/>
+          </a:effectRef>
+          <a:fontRef idx="minor">
+            <a:schemeClr val="tx1"/>
+          </a:fontRef>
+        </p:style>
+      </p:cxnSp>
+      <p:cxnSp>
+        <p:nvCxnSpPr>
+          <p:cNvPr id="30" name="Gerade Verbindung mit Pfeil 29">
+            <a:extLst>
+              <a:ext uri="{FF2B5EF4-FFF2-40B4-BE49-F238E27FC236}">
+                <a16:creationId xmlns:a16="http://schemas.microsoft.com/office/drawing/2014/main" id="{1581B6A0-0F34-43AE-AE2F-4F56E1C2C9DA}"/>
+              </a:ext>
+            </a:extLst>
+          </p:cNvPr>
+          <p:cNvCxnSpPr>
+            <a:cxnSpLocks/>
+            <a:stCxn id="9" idx="2"/>
+          </p:cNvCxnSpPr>
+          <p:nvPr/>
+        </p:nvCxnSpPr>
+        <p:spPr>
+          <a:xfrm>
+            <a:off x="5721849" y="4899489"/>
+            <a:ext cx="0" cy="1052653"/>
+          </a:xfrm>
+          <a:prstGeom prst="straightConnector1">
+            <a:avLst/>
+          </a:prstGeom>
+          <a:ln w="38100">
+            <a:tailEnd type="triangle"/>
+          </a:ln>
+        </p:spPr>
+        <p:style>
+          <a:lnRef idx="1">
+            <a:schemeClr val="accent1"/>
+          </a:lnRef>
+          <a:fillRef idx="0">
+            <a:schemeClr val="accent1"/>
+          </a:fillRef>
+          <a:effectRef idx="0">
+            <a:schemeClr val="accent1"/>
+          </a:effectRef>
+          <a:fontRef idx="minor">
+            <a:schemeClr val="tx1"/>
+          </a:fontRef>
+        </p:style>
+      </p:cxnSp>
+      <p:sp>
+        <p:nvSpPr>
+          <p:cNvPr id="17415" name="Textfeld 17414">
+            <a:extLst>
+              <a:ext uri="{FF2B5EF4-FFF2-40B4-BE49-F238E27FC236}">
+                <a16:creationId xmlns:a16="http://schemas.microsoft.com/office/drawing/2014/main" id="{CB3DFA3B-659F-4111-9534-F23DC2CAE922}"/>
+              </a:ext>
+            </a:extLst>
+          </p:cNvPr>
+          <p:cNvSpPr txBox="1"/>
+          <p:nvPr/>
+        </p:nvSpPr>
+        <p:spPr>
+          <a:xfrm>
+            <a:off x="6495560" y="4108488"/>
+            <a:ext cx="1928733" cy="369332"/>
+          </a:xfrm>
+          <a:prstGeom prst="rect">
+            <a:avLst/>
+          </a:prstGeom>
+          <a:noFill/>
+        </p:spPr>
+        <p:txBody>
+          <a:bodyPr wrap="none" rtlCol="0">
+            <a:spAutoFit/>
+          </a:bodyPr>
+          <a:lstStyle/>
+          <a:p>
+            <a:r>
+              <a:rPr lang="de-DE" dirty="0"/>
+              <a:t>[Palladio skaliert]</a:t>
+            </a:r>
+          </a:p>
+        </p:txBody>
+      </p:sp>
+      <p:sp>
+        <p:nvSpPr>
+          <p:cNvPr id="40" name="Textfeld 39">
+            <a:extLst>
+              <a:ext uri="{FF2B5EF4-FFF2-40B4-BE49-F238E27FC236}">
+                <a16:creationId xmlns:a16="http://schemas.microsoft.com/office/drawing/2014/main" id="{C0548511-223D-4BB0-ADF3-6D2B74D19B54}"/>
+              </a:ext>
+            </a:extLst>
+          </p:cNvPr>
+          <p:cNvSpPr txBox="1"/>
+          <p:nvPr/>
+        </p:nvSpPr>
+        <p:spPr>
+          <a:xfrm>
+            <a:off x="5692155" y="5251745"/>
+            <a:ext cx="2480166" cy="369332"/>
+          </a:xfrm>
+          <a:prstGeom prst="rect">
+            <a:avLst/>
+          </a:prstGeom>
+          <a:noFill/>
+        </p:spPr>
+        <p:txBody>
+          <a:bodyPr wrap="none" rtlCol="0">
+            <a:spAutoFit/>
+          </a:bodyPr>
+          <a:lstStyle/>
+          <a:p>
+            <a:r>
+              <a:rPr lang="de-DE" dirty="0"/>
+              <a:t>[Palladio skaliert nicht]</a:t>
             </a:r>
           </a:p>
         </p:txBody>
@@ -9134,7 +11305,7 @@
     </p:spTree>
     <p:extLst>
       <p:ext uri="{BB962C8B-B14F-4D97-AF65-F5344CB8AC3E}">
-        <p14:creationId xmlns:p14="http://schemas.microsoft.com/office/powerpoint/2010/main" val="2669719383"/>
+        <p14:creationId xmlns:p14="http://schemas.microsoft.com/office/powerpoint/2010/main" val="1862089747"/>
       </p:ext>
     </p:extLst>
   </p:cSld>

</xml_diff>